<commit_message>
Add spark documentation (Report) Add Spark slide (presentation)
</commit_message>
<xml_diff>
--- a/presentation/final_presentation.pptx
+++ b/presentation/final_presentation.pptx
@@ -1336,7 +1336,7 @@
             <a:fld id="{9334D819-9F07-4261-B09B-9E467E5D9002}" type="datetimeFigureOut">
               <a:rPr lang="en-US" dirty="0"/>
               <a:pPr/>
-              <a:t>12/11/2018</a:t>
+              <a:t>12/11/18</a:t>
             </a:fld>
             <a:endParaRPr lang="en-US" dirty="0"/>
           </a:p>
@@ -1570,7 +1570,7 @@
           <a:p>
             <a:fld id="{9334D819-9F07-4261-B09B-9E467E5D9002}" type="datetimeFigureOut">
               <a:rPr lang="en-US" dirty="0"/>
-              <a:t>12/11/2018</a:t>
+              <a:t>12/11/18</a:t>
             </a:fld>
             <a:endParaRPr lang="en-US" dirty="0"/>
           </a:p>
@@ -1745,7 +1745,7 @@
           <a:p>
             <a:fld id="{9334D819-9F07-4261-B09B-9E467E5D9002}" type="datetimeFigureOut">
               <a:rPr lang="en-US" dirty="0"/>
-              <a:t>12/11/2018</a:t>
+              <a:t>12/11/18</a:t>
             </a:fld>
             <a:endParaRPr lang="en-US" dirty="0"/>
           </a:p>
@@ -1910,7 +1910,7 @@
           <a:p>
             <a:fld id="{9334D819-9F07-4261-B09B-9E467E5D9002}" type="datetimeFigureOut">
               <a:rPr lang="en-US" dirty="0"/>
-              <a:t>12/11/2018</a:t>
+              <a:t>12/11/18</a:t>
             </a:fld>
             <a:endParaRPr lang="en-US" dirty="0"/>
           </a:p>
@@ -2179,7 +2179,7 @@
             <a:fld id="{9334D819-9F07-4261-B09B-9E467E5D9002}" type="datetimeFigureOut">
               <a:rPr lang="en-US" dirty="0"/>
               <a:pPr/>
-              <a:t>12/11/2018</a:t>
+              <a:t>12/11/18</a:t>
             </a:fld>
             <a:endParaRPr lang="en-US" dirty="0"/>
           </a:p>
@@ -3376,7 +3376,7 @@
           <a:p>
             <a:fld id="{9334D819-9F07-4261-B09B-9E467E5D9002}" type="datetimeFigureOut">
               <a:rPr lang="en-US" dirty="0"/>
-              <a:t>12/11/2018</a:t>
+              <a:t>12/11/18</a:t>
             </a:fld>
             <a:endParaRPr lang="en-US" dirty="0"/>
           </a:p>
@@ -3761,7 +3761,7 @@
           <a:p>
             <a:fld id="{9334D819-9F07-4261-B09B-9E467E5D9002}" type="datetimeFigureOut">
               <a:rPr lang="en-US" dirty="0"/>
-              <a:t>12/11/2018</a:t>
+              <a:t>12/11/18</a:t>
             </a:fld>
             <a:endParaRPr lang="en-US" dirty="0"/>
           </a:p>
@@ -3879,7 +3879,7 @@
           <a:p>
             <a:fld id="{9334D819-9F07-4261-B09B-9E467E5D9002}" type="datetimeFigureOut">
               <a:rPr lang="en-US" dirty="0"/>
-              <a:t>12/11/2018</a:t>
+              <a:t>12/11/18</a:t>
             </a:fld>
             <a:endParaRPr lang="en-US" dirty="0"/>
           </a:p>
@@ -3969,7 +3969,7 @@
           <a:p>
             <a:fld id="{9334D819-9F07-4261-B09B-9E467E5D9002}" type="datetimeFigureOut">
               <a:rPr lang="en-US" dirty="0"/>
-              <a:t>12/11/2018</a:t>
+              <a:t>12/11/18</a:t>
             </a:fld>
             <a:endParaRPr lang="en-US" dirty="0"/>
           </a:p>
@@ -4727,7 +4727,7 @@
           <a:p>
             <a:fld id="{9334D819-9F07-4261-B09B-9E467E5D9002}" type="datetimeFigureOut">
               <a:rPr lang="en-US" dirty="0"/>
-              <a:t>12/11/2018</a:t>
+              <a:t>12/11/18</a:t>
             </a:fld>
             <a:endParaRPr lang="en-US" dirty="0"/>
           </a:p>
@@ -5562,7 +5562,7 @@
           <a:p>
             <a:fld id="{9334D819-9F07-4261-B09B-9E467E5D9002}" type="datetimeFigureOut">
               <a:rPr lang="en-US" dirty="0"/>
-              <a:t>12/11/2018</a:t>
+              <a:t>12/11/18</a:t>
             </a:fld>
             <a:endParaRPr lang="en-US" dirty="0"/>
           </a:p>
@@ -5785,7 +5785,7 @@
             <a:fld id="{9334D819-9F07-4261-B09B-9E467E5D9002}" type="datetimeFigureOut">
               <a:rPr lang="en-US" dirty="0"/>
               <a:pPr/>
-              <a:t>12/11/2018</a:t>
+              <a:t>12/11/18</a:t>
             </a:fld>
             <a:endParaRPr lang="en-US" dirty="0"/>
           </a:p>
@@ -16522,134 +16522,84 @@
             </a:lvl9pPr>
           </a:lstStyle>
           <a:p>
-            <a:r>
-              <a:rPr lang="en-US" b="1" dirty="0">
-                <a:solidFill>
-                  <a:srgbClr val="000000"/>
-                </a:solidFill>
-              </a:rPr>
-              <a:t>Initialization</a:t>
-            </a:r>
-          </a:p>
-          <a:p>
-            <a:pPr lvl="1"/>
-            <a:r>
-              <a:rPr lang="en-US" sz="2000" dirty="0">
-                <a:solidFill>
-                  <a:srgbClr val="000000"/>
-                </a:solidFill>
-              </a:rPr>
-              <a:t>Cities coordinates =&gt; </a:t>
-            </a:r>
-            <a:r>
-              <a:rPr lang="en-US" sz="2000" dirty="0" err="1">
-                <a:solidFill>
-                  <a:srgbClr val="000000"/>
-                </a:solidFill>
-              </a:rPr>
-              <a:t>PairRDD</a:t>
-            </a:r>
-            <a:r>
-              <a:rPr lang="en-US" sz="2000" dirty="0">
-                <a:solidFill>
-                  <a:srgbClr val="000000"/>
-                </a:solidFill>
-              </a:rPr>
-              <a:t> (Adjacency Matrix) for cost function. Distributed and cashed once.</a:t>
-            </a:r>
-          </a:p>
-          <a:p>
-            <a:pPr lvl="2"/>
-            <a:r>
-              <a:rPr lang="en-US" sz="2000" dirty="0">
-                <a:solidFill>
-                  <a:srgbClr val="000000"/>
-                </a:solidFill>
-              </a:rPr>
-              <a:t>KEY = executor,   VALUE = List (CITY_0_KEY: distance, CITY_1_KEY : distance ...)</a:t>
-            </a:r>
-          </a:p>
-          <a:p>
-            <a:r>
-              <a:rPr lang="en-US" b="1" dirty="0">
-                <a:solidFill>
-                  <a:srgbClr val="000000"/>
-                </a:solidFill>
-              </a:rPr>
-              <a:t>Loop</a:t>
-            </a:r>
-          </a:p>
-          <a:p>
-            <a:pPr lvl="1"/>
-            <a:r>
-              <a:rPr lang="en-US" sz="2000" dirty="0">
-                <a:solidFill>
-                  <a:srgbClr val="000000"/>
-                </a:solidFill>
-              </a:rPr>
-              <a:t>Best tours =&gt; </a:t>
-            </a:r>
-            <a:r>
-              <a:rPr lang="en-US" sz="2000" dirty="0" err="1">
-                <a:solidFill>
-                  <a:srgbClr val="000000"/>
-                </a:solidFill>
-              </a:rPr>
-              <a:t>PairRDD</a:t>
-            </a:r>
-            <a:r>
-              <a:rPr lang="en-US" sz="2000" dirty="0">
-                <a:solidFill>
-                  <a:srgbClr val="000000"/>
-                </a:solidFill>
-              </a:rPr>
-              <a:t> maintains best tour from a set of tour generations.</a:t>
-            </a:r>
-          </a:p>
-          <a:p>
-            <a:pPr lvl="2"/>
-            <a:r>
-              <a:rPr lang="en-US" sz="2000" dirty="0">
-                <a:solidFill>
-                  <a:srgbClr val="000000"/>
-                </a:solidFill>
-              </a:rPr>
-              <a:t>KEY=</a:t>
-            </a:r>
-            <a:r>
-              <a:rPr lang="en-US" sz="2000" dirty="0" err="1">
-                <a:solidFill>
-                  <a:srgbClr val="000000"/>
-                </a:solidFill>
-              </a:rPr>
-              <a:t>executor_number</a:t>
-            </a:r>
-            <a:r>
-              <a:rPr lang="en-US" sz="2000" dirty="0">
-                <a:solidFill>
-                  <a:srgbClr val="000000"/>
-                </a:solidFill>
-              </a:rPr>
-              <a:t>, VALUE = Best generated tour by the executor</a:t>
-            </a:r>
-          </a:p>
-          <a:p>
-            <a:pPr lvl="2"/>
-            <a:r>
-              <a:rPr lang="en-US" sz="2000" dirty="0" err="1">
-                <a:solidFill>
-                  <a:srgbClr val="000000"/>
-                </a:solidFill>
-              </a:rPr>
-              <a:t>BestToursRDD</a:t>
-            </a:r>
-            <a:r>
-              <a:rPr lang="en-US" sz="2000" dirty="0">
-                <a:solidFill>
-                  <a:srgbClr val="000000"/>
-                </a:solidFill>
-              </a:rPr>
-              <a:t> values get reduced each iteration to get best tour for the next iteration and so on..</a:t>
+            <a:pPr marL="0" indent="0">
+              <a:buNone/>
+            </a:pPr>
+            <a:r>
+              <a:rPr lang="en-US" dirty="0"/>
+              <a:t>Broadcasting:</a:t>
+            </a:r>
+          </a:p>
+          <a:p>
+            <a:pPr marL="0" indent="0">
+              <a:buNone/>
+            </a:pPr>
+            <a:r>
+              <a:rPr lang="en-US" dirty="0"/>
+              <a:t>	Array of Random-Generators each with different seed</a:t>
+            </a:r>
+          </a:p>
+          <a:p>
+            <a:pPr marL="0" indent="0">
+              <a:buNone/>
+            </a:pPr>
+            <a:r>
+              <a:rPr lang="en-US" dirty="0"/>
+              <a:t>	Best solution</a:t>
+            </a:r>
+          </a:p>
+          <a:p>
+            <a:pPr marL="0" indent="0">
+              <a:buNone/>
+            </a:pPr>
+            <a:r>
+              <a:rPr lang="en-US" dirty="0"/>
+              <a:t>RDD: </a:t>
+            </a:r>
+          </a:p>
+          <a:p>
+            <a:pPr marL="0" indent="0">
+              <a:buNone/>
+            </a:pPr>
+            <a:r>
+              <a:rPr lang="en-US" dirty="0"/>
+              <a:t>	Contain initial solutions as many as the number of partitions</a:t>
+            </a:r>
+          </a:p>
+          <a:p>
+            <a:pPr marL="0" indent="0">
+              <a:buNone/>
+            </a:pPr>
+            <a:r>
+              <a:rPr lang="en-US" dirty="0"/>
+              <a:t>Technique:</a:t>
+            </a:r>
+          </a:p>
+          <a:p>
+            <a:pPr marL="0" indent="0">
+              <a:buNone/>
+            </a:pPr>
+            <a:r>
+              <a:rPr lang="en-US" dirty="0"/>
+              <a:t>	Map transformation to execute the inner loop</a:t>
+            </a:r>
+          </a:p>
+          <a:p>
+            <a:pPr marL="0" indent="0">
+              <a:buNone/>
+            </a:pPr>
+            <a:r>
+              <a:rPr lang="en-US" dirty="0"/>
+              <a:t>	Reduce for best solution</a:t>
+            </a:r>
+          </a:p>
+          <a:p>
+            <a:pPr marL="0" indent="0">
+              <a:buNone/>
+            </a:pPr>
+            <a:r>
+              <a:rPr lang="en-US" dirty="0"/>
+              <a:t>	Broadcast the best solution and repeat until outer loop’s condition is satisfied</a:t>
             </a:r>
           </a:p>
           <a:p>

</xml_diff>

<commit_message>
added final changes to PPT
</commit_message>
<xml_diff>
--- a/presentation/final_presentation.pptx
+++ b/presentation/final_presentation.pptx
@@ -1336,7 +1336,7 @@
             <a:fld id="{9334D819-9F07-4261-B09B-9E467E5D9002}" type="datetimeFigureOut">
               <a:rPr lang="en-US" dirty="0"/>
               <a:pPr/>
-              <a:t>12/11/18</a:t>
+              <a:t>12/11/2018</a:t>
             </a:fld>
             <a:endParaRPr lang="en-US" dirty="0"/>
           </a:p>
@@ -1570,7 +1570,7 @@
           <a:p>
             <a:fld id="{9334D819-9F07-4261-B09B-9E467E5D9002}" type="datetimeFigureOut">
               <a:rPr lang="en-US" dirty="0"/>
-              <a:t>12/11/18</a:t>
+              <a:t>12/11/2018</a:t>
             </a:fld>
             <a:endParaRPr lang="en-US" dirty="0"/>
           </a:p>
@@ -1745,7 +1745,7 @@
           <a:p>
             <a:fld id="{9334D819-9F07-4261-B09B-9E467E5D9002}" type="datetimeFigureOut">
               <a:rPr lang="en-US" dirty="0"/>
-              <a:t>12/11/18</a:t>
+              <a:t>12/11/2018</a:t>
             </a:fld>
             <a:endParaRPr lang="en-US" dirty="0"/>
           </a:p>
@@ -1910,7 +1910,7 @@
           <a:p>
             <a:fld id="{9334D819-9F07-4261-B09B-9E467E5D9002}" type="datetimeFigureOut">
               <a:rPr lang="en-US" dirty="0"/>
-              <a:t>12/11/18</a:t>
+              <a:t>12/11/2018</a:t>
             </a:fld>
             <a:endParaRPr lang="en-US" dirty="0"/>
           </a:p>
@@ -2179,7 +2179,7 @@
             <a:fld id="{9334D819-9F07-4261-B09B-9E467E5D9002}" type="datetimeFigureOut">
               <a:rPr lang="en-US" dirty="0"/>
               <a:pPr/>
-              <a:t>12/11/18</a:t>
+              <a:t>12/11/2018</a:t>
             </a:fld>
             <a:endParaRPr lang="en-US" dirty="0"/>
           </a:p>
@@ -3376,7 +3376,7 @@
           <a:p>
             <a:fld id="{9334D819-9F07-4261-B09B-9E467E5D9002}" type="datetimeFigureOut">
               <a:rPr lang="en-US" dirty="0"/>
-              <a:t>12/11/18</a:t>
+              <a:t>12/11/2018</a:t>
             </a:fld>
             <a:endParaRPr lang="en-US" dirty="0"/>
           </a:p>
@@ -3761,7 +3761,7 @@
           <a:p>
             <a:fld id="{9334D819-9F07-4261-B09B-9E467E5D9002}" type="datetimeFigureOut">
               <a:rPr lang="en-US" dirty="0"/>
-              <a:t>12/11/18</a:t>
+              <a:t>12/11/2018</a:t>
             </a:fld>
             <a:endParaRPr lang="en-US" dirty="0"/>
           </a:p>
@@ -3879,7 +3879,7 @@
           <a:p>
             <a:fld id="{9334D819-9F07-4261-B09B-9E467E5D9002}" type="datetimeFigureOut">
               <a:rPr lang="en-US" dirty="0"/>
-              <a:t>12/11/18</a:t>
+              <a:t>12/11/2018</a:t>
             </a:fld>
             <a:endParaRPr lang="en-US" dirty="0"/>
           </a:p>
@@ -3969,7 +3969,7 @@
           <a:p>
             <a:fld id="{9334D819-9F07-4261-B09B-9E467E5D9002}" type="datetimeFigureOut">
               <a:rPr lang="en-US" dirty="0"/>
-              <a:t>12/11/18</a:t>
+              <a:t>12/11/2018</a:t>
             </a:fld>
             <a:endParaRPr lang="en-US" dirty="0"/>
           </a:p>
@@ -4727,7 +4727,7 @@
           <a:p>
             <a:fld id="{9334D819-9F07-4261-B09B-9E467E5D9002}" type="datetimeFigureOut">
               <a:rPr lang="en-US" dirty="0"/>
-              <a:t>12/11/18</a:t>
+              <a:t>12/11/2018</a:t>
             </a:fld>
             <a:endParaRPr lang="en-US" dirty="0"/>
           </a:p>
@@ -5562,7 +5562,7 @@
           <a:p>
             <a:fld id="{9334D819-9F07-4261-B09B-9E467E5D9002}" type="datetimeFigureOut">
               <a:rPr lang="en-US" dirty="0"/>
-              <a:t>12/11/18</a:t>
+              <a:t>12/11/2018</a:t>
             </a:fld>
             <a:endParaRPr lang="en-US" dirty="0"/>
           </a:p>
@@ -5785,7 +5785,7 @@
             <a:fld id="{9334D819-9F07-4261-B09B-9E467E5D9002}" type="datetimeFigureOut">
               <a:rPr lang="en-US" dirty="0"/>
               <a:pPr/>
-              <a:t>12/11/18</a:t>
+              <a:t>12/11/2018</a:t>
             </a:fld>
             <a:endParaRPr lang="en-US" dirty="0"/>
           </a:p>
@@ -7101,10 +7101,10 @@
       </p:sp>
       <p:pic>
         <p:nvPicPr>
-          <p:cNvPr id="5" name="Picture 4">
+          <p:cNvPr id="8" name="Picture 7">
             <a:extLst>
               <a:ext uri="{FF2B5EF4-FFF2-40B4-BE49-F238E27FC236}">
-                <a16:creationId xmlns:a16="http://schemas.microsoft.com/office/drawing/2014/main" id="{600E9B34-3DD3-4889-B529-1EB68596C88F}"/>
+                <a16:creationId xmlns:a16="http://schemas.microsoft.com/office/drawing/2014/main" id="{03310A79-D8AC-4E3F-8DCE-0C18CA373E12}"/>
               </a:ext>
             </a:extLst>
           </p:cNvPr>
@@ -7121,8 +7121,8 @@
         </p:blipFill>
         <p:spPr>
           <a:xfrm>
-            <a:off x="6531856" y="1289275"/>
-            <a:ext cx="4810280" cy="3711933"/>
+            <a:off x="1126835" y="1485525"/>
+            <a:ext cx="4918849" cy="3795712"/>
           </a:xfrm>
           <a:prstGeom prst="rect">
             <a:avLst/>
@@ -7131,10 +7131,10 @@
       </p:pic>
       <p:pic>
         <p:nvPicPr>
-          <p:cNvPr id="7" name="Picture 6">
+          <p:cNvPr id="10" name="Picture 9">
             <a:extLst>
               <a:ext uri="{FF2B5EF4-FFF2-40B4-BE49-F238E27FC236}">
-                <a16:creationId xmlns:a16="http://schemas.microsoft.com/office/drawing/2014/main" id="{D3524233-B650-4AD7-8A84-2476272A70E6}"/>
+                <a16:creationId xmlns:a16="http://schemas.microsoft.com/office/drawing/2014/main" id="{DFEC888A-16EB-40C7-A780-B55294D13A92}"/>
               </a:ext>
             </a:extLst>
           </p:cNvPr>
@@ -7151,8 +7151,8 @@
         </p:blipFill>
         <p:spPr>
           <a:xfrm>
-            <a:off x="1126835" y="1289276"/>
-            <a:ext cx="4810279" cy="3711932"/>
+            <a:off x="6591238" y="1485526"/>
+            <a:ext cx="4918849" cy="3795712"/>
           </a:xfrm>
           <a:prstGeom prst="rect">
             <a:avLst/>
@@ -7224,6 +7224,539 @@
           </a:p>
         </p:txBody>
       </p:sp>
+      <p:graphicFrame>
+        <p:nvGraphicFramePr>
+          <p:cNvPr id="3" name="Table 2">
+            <a:extLst>
+              <a:ext uri="{FF2B5EF4-FFF2-40B4-BE49-F238E27FC236}">
+                <a16:creationId xmlns:a16="http://schemas.microsoft.com/office/drawing/2014/main" id="{9B3CD3D8-241A-4A2C-86AA-40594BC34EC9}"/>
+              </a:ext>
+            </a:extLst>
+          </p:cNvPr>
+          <p:cNvGraphicFramePr>
+            <a:graphicFrameLocks noGrp="1"/>
+          </p:cNvGraphicFramePr>
+          <p:nvPr>
+            <p:extLst>
+              <p:ext uri="{D42A27DB-BD31-4B8C-83A1-F6EECF244321}">
+                <p14:modId xmlns:p14="http://schemas.microsoft.com/office/powerpoint/2010/main" val="1435046368"/>
+              </p:ext>
+            </p:extLst>
+          </p:nvPr>
+        </p:nvGraphicFramePr>
+        <p:xfrm>
+          <a:off x="2032000" y="2316480"/>
+          <a:ext cx="8128000" cy="2225040"/>
+        </p:xfrm>
+        <a:graphic>
+          <a:graphicData uri="http://schemas.openxmlformats.org/drawingml/2006/table">
+            <a:tbl>
+              <a:tblPr firstRow="1" bandRow="1">
+                <a:tableStyleId>{21E4AEA4-8DFA-4A89-87EB-49C32662AFE0}</a:tableStyleId>
+              </a:tblPr>
+              <a:tblGrid>
+                <a:gridCol w="1625600">
+                  <a:extLst>
+                    <a:ext uri="{9D8B030D-6E8A-4147-A177-3AD203B41FA5}">
+                      <a16:colId xmlns:a16="http://schemas.microsoft.com/office/drawing/2014/main" val="3516125036"/>
+                    </a:ext>
+                  </a:extLst>
+                </a:gridCol>
+                <a:gridCol w="1625600">
+                  <a:extLst>
+                    <a:ext uri="{9D8B030D-6E8A-4147-A177-3AD203B41FA5}">
+                      <a16:colId xmlns:a16="http://schemas.microsoft.com/office/drawing/2014/main" val="1209717373"/>
+                    </a:ext>
+                  </a:extLst>
+                </a:gridCol>
+                <a:gridCol w="2171959">
+                  <a:extLst>
+                    <a:ext uri="{9D8B030D-6E8A-4147-A177-3AD203B41FA5}">
+                      <a16:colId xmlns:a16="http://schemas.microsoft.com/office/drawing/2014/main" val="367202967"/>
+                    </a:ext>
+                  </a:extLst>
+                </a:gridCol>
+                <a:gridCol w="1079241">
+                  <a:extLst>
+                    <a:ext uri="{9D8B030D-6E8A-4147-A177-3AD203B41FA5}">
+                      <a16:colId xmlns:a16="http://schemas.microsoft.com/office/drawing/2014/main" val="2060615624"/>
+                    </a:ext>
+                  </a:extLst>
+                </a:gridCol>
+                <a:gridCol w="1625600">
+                  <a:extLst>
+                    <a:ext uri="{9D8B030D-6E8A-4147-A177-3AD203B41FA5}">
+                      <a16:colId xmlns:a16="http://schemas.microsoft.com/office/drawing/2014/main" val="835010506"/>
+                    </a:ext>
+                  </a:extLst>
+                </a:gridCol>
+              </a:tblGrid>
+              <a:tr h="370840">
+                <a:tc>
+                  <a:txBody>
+                    <a:bodyPr/>
+                    <a:lstStyle/>
+                    <a:p>
+                      <a:r>
+                        <a:rPr lang="en-IN" dirty="0"/>
+                        <a:t>Version</a:t>
+                      </a:r>
+                    </a:p>
+                  </a:txBody>
+                  <a:tcPr>
+                    <a:solidFill>
+                      <a:schemeClr val="accent2">
+                        <a:lumMod val="50000"/>
+                      </a:schemeClr>
+                    </a:solidFill>
+                  </a:tcPr>
+                </a:tc>
+                <a:tc>
+                  <a:txBody>
+                    <a:bodyPr/>
+                    <a:lstStyle/>
+                    <a:p>
+                      <a:r>
+                        <a:rPr lang="en-IN" dirty="0"/>
+                        <a:t># of Classes</a:t>
+                      </a:r>
+                    </a:p>
+                  </a:txBody>
+                  <a:tcPr>
+                    <a:solidFill>
+                      <a:schemeClr val="accent2">
+                        <a:lumMod val="50000"/>
+                      </a:schemeClr>
+                    </a:solidFill>
+                  </a:tcPr>
+                </a:tc>
+                <a:tc>
+                  <a:txBody>
+                    <a:bodyPr/>
+                    <a:lstStyle/>
+                    <a:p>
+                      <a:r>
+                        <a:rPr lang="en-IN" dirty="0"/>
+                        <a:t># Boilerplate Calls</a:t>
+                      </a:r>
+                    </a:p>
+                  </a:txBody>
+                  <a:tcPr>
+                    <a:solidFill>
+                      <a:schemeClr val="accent2">
+                        <a:lumMod val="50000"/>
+                      </a:schemeClr>
+                    </a:solidFill>
+                  </a:tcPr>
+                </a:tc>
+                <a:tc>
+                  <a:txBody>
+                    <a:bodyPr/>
+                    <a:lstStyle/>
+                    <a:p>
+                      <a:r>
+                        <a:rPr lang="en-IN" dirty="0"/>
+                        <a:t>TLOC</a:t>
+                      </a:r>
+                    </a:p>
+                  </a:txBody>
+                  <a:tcPr>
+                    <a:solidFill>
+                      <a:schemeClr val="accent2">
+                        <a:lumMod val="50000"/>
+                      </a:schemeClr>
+                    </a:solidFill>
+                  </a:tcPr>
+                </a:tc>
+                <a:tc>
+                  <a:txBody>
+                    <a:bodyPr/>
+                    <a:lstStyle/>
+                    <a:p>
+                      <a:r>
+                        <a:rPr lang="en-IN" dirty="0"/>
+                        <a:t>Boilerplate %</a:t>
+                      </a:r>
+                    </a:p>
+                  </a:txBody>
+                  <a:tcPr>
+                    <a:solidFill>
+                      <a:schemeClr val="accent2">
+                        <a:lumMod val="50000"/>
+                      </a:schemeClr>
+                    </a:solidFill>
+                  </a:tcPr>
+                </a:tc>
+                <a:extLst>
+                  <a:ext uri="{0D108BD9-81ED-4DB2-BD59-A6C34878D82A}">
+                    <a16:rowId xmlns:a16="http://schemas.microsoft.com/office/drawing/2014/main" val="3892189803"/>
+                  </a:ext>
+                </a:extLst>
+              </a:tr>
+              <a:tr h="370840">
+                <a:tc>
+                  <a:txBody>
+                    <a:bodyPr/>
+                    <a:lstStyle/>
+                    <a:p>
+                      <a:r>
+                        <a:rPr lang="en-IN" dirty="0"/>
+                        <a:t>Sequential</a:t>
+                      </a:r>
+                    </a:p>
+                  </a:txBody>
+                  <a:tcPr/>
+                </a:tc>
+                <a:tc>
+                  <a:txBody>
+                    <a:bodyPr/>
+                    <a:lstStyle/>
+                    <a:p>
+                      <a:r>
+                        <a:rPr lang="en-IN" dirty="0"/>
+                        <a:t>4</a:t>
+                      </a:r>
+                    </a:p>
+                  </a:txBody>
+                  <a:tcPr/>
+                </a:tc>
+                <a:tc>
+                  <a:txBody>
+                    <a:bodyPr/>
+                    <a:lstStyle/>
+                    <a:p>
+                      <a:r>
+                        <a:rPr lang="en-IN" dirty="0"/>
+                        <a:t>N/A</a:t>
+                      </a:r>
+                    </a:p>
+                  </a:txBody>
+                  <a:tcPr/>
+                </a:tc>
+                <a:tc>
+                  <a:txBody>
+                    <a:bodyPr/>
+                    <a:lstStyle/>
+                    <a:p>
+                      <a:r>
+                        <a:rPr lang="en-IN" dirty="0"/>
+                        <a:t>104</a:t>
+                      </a:r>
+                    </a:p>
+                  </a:txBody>
+                  <a:tcPr/>
+                </a:tc>
+                <a:tc>
+                  <a:txBody>
+                    <a:bodyPr/>
+                    <a:lstStyle/>
+                    <a:p>
+                      <a:r>
+                        <a:rPr lang="en-IN" dirty="0"/>
+                        <a:t>N/A</a:t>
+                      </a:r>
+                    </a:p>
+                  </a:txBody>
+                  <a:tcPr/>
+                </a:tc>
+                <a:extLst>
+                  <a:ext uri="{0D108BD9-81ED-4DB2-BD59-A6C34878D82A}">
+                    <a16:rowId xmlns:a16="http://schemas.microsoft.com/office/drawing/2014/main" val="3078488526"/>
+                  </a:ext>
+                </a:extLst>
+              </a:tr>
+              <a:tr h="370840">
+                <a:tc>
+                  <a:txBody>
+                    <a:bodyPr/>
+                    <a:lstStyle/>
+                    <a:p>
+                      <a:r>
+                        <a:rPr lang="en-IN" dirty="0"/>
+                        <a:t>MPI JAVA </a:t>
+                      </a:r>
+                    </a:p>
+                  </a:txBody>
+                  <a:tcPr/>
+                </a:tc>
+                <a:tc>
+                  <a:txBody>
+                    <a:bodyPr/>
+                    <a:lstStyle/>
+                    <a:p>
+                      <a:r>
+                        <a:rPr lang="en-IN" dirty="0"/>
+                        <a:t>6</a:t>
+                      </a:r>
+                    </a:p>
+                  </a:txBody>
+                  <a:tcPr/>
+                </a:tc>
+                <a:tc>
+                  <a:txBody>
+                    <a:bodyPr/>
+                    <a:lstStyle/>
+                    <a:p>
+                      <a:r>
+                        <a:rPr lang="en-IN" dirty="0"/>
+                        <a:t>18</a:t>
+                      </a:r>
+                    </a:p>
+                  </a:txBody>
+                  <a:tcPr/>
+                </a:tc>
+                <a:tc>
+                  <a:txBody>
+                    <a:bodyPr/>
+                    <a:lstStyle/>
+                    <a:p>
+                      <a:r>
+                        <a:rPr lang="en-IN" dirty="0"/>
+                        <a:t>137</a:t>
+                      </a:r>
+                    </a:p>
+                  </a:txBody>
+                  <a:tcPr/>
+                </a:tc>
+                <a:tc>
+                  <a:txBody>
+                    <a:bodyPr/>
+                    <a:lstStyle/>
+                    <a:p>
+                      <a:r>
+                        <a:rPr lang="en-IN" dirty="0"/>
+                        <a:t>13.14</a:t>
+                      </a:r>
+                    </a:p>
+                  </a:txBody>
+                  <a:tcPr/>
+                </a:tc>
+                <a:extLst>
+                  <a:ext uri="{0D108BD9-81ED-4DB2-BD59-A6C34878D82A}">
+                    <a16:rowId xmlns:a16="http://schemas.microsoft.com/office/drawing/2014/main" val="1047554739"/>
+                  </a:ext>
+                </a:extLst>
+              </a:tr>
+              <a:tr h="370840">
+                <a:tc>
+                  <a:txBody>
+                    <a:bodyPr/>
+                    <a:lstStyle/>
+                    <a:p>
+                      <a:r>
+                        <a:rPr lang="en-IN" dirty="0"/>
+                        <a:t>MapReduce</a:t>
+                      </a:r>
+                    </a:p>
+                  </a:txBody>
+                  <a:tcPr/>
+                </a:tc>
+                <a:tc>
+                  <a:txBody>
+                    <a:bodyPr/>
+                    <a:lstStyle/>
+                    <a:p>
+                      <a:r>
+                        <a:rPr lang="en-IN" dirty="0"/>
+                        <a:t>6</a:t>
+                      </a:r>
+                    </a:p>
+                  </a:txBody>
+                  <a:tcPr/>
+                </a:tc>
+                <a:tc>
+                  <a:txBody>
+                    <a:bodyPr/>
+                    <a:lstStyle/>
+                    <a:p>
+                      <a:r>
+                        <a:rPr lang="en-IN" dirty="0"/>
+                        <a:t>19</a:t>
+                      </a:r>
+                    </a:p>
+                  </a:txBody>
+                  <a:tcPr/>
+                </a:tc>
+                <a:tc>
+                  <a:txBody>
+                    <a:bodyPr/>
+                    <a:lstStyle/>
+                    <a:p>
+                      <a:r>
+                        <a:rPr lang="en-IN" dirty="0"/>
+                        <a:t>141</a:t>
+                      </a:r>
+                    </a:p>
+                  </a:txBody>
+                  <a:tcPr/>
+                </a:tc>
+                <a:tc>
+                  <a:txBody>
+                    <a:bodyPr/>
+                    <a:lstStyle/>
+                    <a:p>
+                      <a:r>
+                        <a:rPr lang="en-IN" dirty="0"/>
+                        <a:t>13.48</a:t>
+                      </a:r>
+                    </a:p>
+                  </a:txBody>
+                  <a:tcPr/>
+                </a:tc>
+                <a:extLst>
+                  <a:ext uri="{0D108BD9-81ED-4DB2-BD59-A6C34878D82A}">
+                    <a16:rowId xmlns:a16="http://schemas.microsoft.com/office/drawing/2014/main" val="2714413370"/>
+                  </a:ext>
+                </a:extLst>
+              </a:tr>
+              <a:tr h="370840">
+                <a:tc>
+                  <a:txBody>
+                    <a:bodyPr/>
+                    <a:lstStyle/>
+                    <a:p>
+                      <a:r>
+                        <a:rPr lang="en-IN" dirty="0"/>
+                        <a:t>Spark</a:t>
+                      </a:r>
+                    </a:p>
+                  </a:txBody>
+                  <a:tcPr/>
+                </a:tc>
+                <a:tc>
+                  <a:txBody>
+                    <a:bodyPr/>
+                    <a:lstStyle/>
+                    <a:p>
+                      <a:r>
+                        <a:rPr lang="en-IN" dirty="0"/>
+                        <a:t>5</a:t>
+                      </a:r>
+                    </a:p>
+                  </a:txBody>
+                  <a:tcPr/>
+                </a:tc>
+                <a:tc>
+                  <a:txBody>
+                    <a:bodyPr/>
+                    <a:lstStyle/>
+                    <a:p>
+                      <a:r>
+                        <a:rPr lang="en-IN" dirty="0"/>
+                        <a:t>4</a:t>
+                      </a:r>
+                    </a:p>
+                  </a:txBody>
+                  <a:tcPr/>
+                </a:tc>
+                <a:tc>
+                  <a:txBody>
+                    <a:bodyPr/>
+                    <a:lstStyle/>
+                    <a:p>
+                      <a:r>
+                        <a:rPr lang="en-IN" dirty="0"/>
+                        <a:t>128</a:t>
+                      </a:r>
+                    </a:p>
+                  </a:txBody>
+                  <a:tcPr/>
+                </a:tc>
+                <a:tc>
+                  <a:txBody>
+                    <a:bodyPr/>
+                    <a:lstStyle/>
+                    <a:p>
+                      <a:r>
+                        <a:rPr lang="en-IN" dirty="0"/>
+                        <a:t>3.13</a:t>
+                      </a:r>
+                    </a:p>
+                  </a:txBody>
+                  <a:tcPr/>
+                </a:tc>
+                <a:extLst>
+                  <a:ext uri="{0D108BD9-81ED-4DB2-BD59-A6C34878D82A}">
+                    <a16:rowId xmlns:a16="http://schemas.microsoft.com/office/drawing/2014/main" val="3551136238"/>
+                  </a:ext>
+                </a:extLst>
+              </a:tr>
+              <a:tr h="370840">
+                <a:tc>
+                  <a:txBody>
+                    <a:bodyPr/>
+                    <a:lstStyle/>
+                    <a:p>
+                      <a:r>
+                        <a:rPr lang="en-IN" dirty="0"/>
+                        <a:t>MASS</a:t>
+                      </a:r>
+                    </a:p>
+                  </a:txBody>
+                  <a:tcPr/>
+                </a:tc>
+                <a:tc>
+                  <a:txBody>
+                    <a:bodyPr/>
+                    <a:lstStyle/>
+                    <a:p>
+                      <a:r>
+                        <a:rPr lang="en-IN" dirty="0"/>
+                        <a:t>6</a:t>
+                      </a:r>
+                    </a:p>
+                  </a:txBody>
+                  <a:tcPr/>
+                </a:tc>
+                <a:tc>
+                  <a:txBody>
+                    <a:bodyPr/>
+                    <a:lstStyle/>
+                    <a:p>
+                      <a:r>
+                        <a:rPr lang="en-IN" dirty="0"/>
+                        <a:t>47</a:t>
+                      </a:r>
+                    </a:p>
+                  </a:txBody>
+                  <a:tcPr/>
+                </a:tc>
+                <a:tc>
+                  <a:txBody>
+                    <a:bodyPr/>
+                    <a:lstStyle/>
+                    <a:p>
+                      <a:r>
+                        <a:rPr lang="en-IN" dirty="0"/>
+                        <a:t>135</a:t>
+                      </a:r>
+                    </a:p>
+                  </a:txBody>
+                  <a:tcPr/>
+                </a:tc>
+                <a:tc>
+                  <a:txBody>
+                    <a:bodyPr/>
+                    <a:lstStyle/>
+                    <a:p>
+                      <a:r>
+                        <a:rPr lang="en-IN" dirty="0"/>
+                        <a:t>34.81</a:t>
+                      </a:r>
+                    </a:p>
+                  </a:txBody>
+                  <a:tcPr/>
+                </a:tc>
+                <a:extLst>
+                  <a:ext uri="{0D108BD9-81ED-4DB2-BD59-A6C34878D82A}">
+                    <a16:rowId xmlns:a16="http://schemas.microsoft.com/office/drawing/2014/main" val="1185733514"/>
+                  </a:ext>
+                </a:extLst>
+              </a:tr>
+            </a:tbl>
+          </a:graphicData>
+        </a:graphic>
+      </p:graphicFrame>
     </p:spTree>
     <p:extLst>
       <p:ext uri="{BB962C8B-B14F-4D97-AF65-F5344CB8AC3E}">
@@ -7584,2201 +8117,36 @@
           </a:p>
         </p:txBody>
       </p:sp>
-      <p:sp>
-        <p:nvSpPr>
-          <p:cNvPr id="7" name="Rectangle 6">
+      <p:pic>
+        <p:nvPicPr>
+          <p:cNvPr id="4" name="Picture 3">
             <a:extLst>
               <a:ext uri="{FF2B5EF4-FFF2-40B4-BE49-F238E27FC236}">
-                <a16:creationId xmlns:a16="http://schemas.microsoft.com/office/drawing/2014/main" id="{0865B424-6D4D-49D2-976C-29D9D4D1E072}"/>
+                <a16:creationId xmlns:a16="http://schemas.microsoft.com/office/drawing/2014/main" id="{D6612EDD-9D43-4AC2-895C-A2C73D70523B}"/>
               </a:ext>
             </a:extLst>
           </p:cNvPr>
-          <p:cNvSpPr/>
+          <p:cNvPicPr>
+            <a:picLocks noChangeAspect="1"/>
+          </p:cNvPicPr>
           <p:nvPr/>
-        </p:nvSpPr>
+        </p:nvPicPr>
+        <p:blipFill>
+          <a:blip r:embed="rId2"/>
+          <a:stretch>
+            <a:fillRect/>
+          </a:stretch>
+        </p:blipFill>
         <p:spPr>
           <a:xfrm>
-            <a:off x="1412033" y="1259175"/>
-            <a:ext cx="9878008" cy="4339650"/>
+            <a:off x="2190750" y="1083225"/>
+            <a:ext cx="7810500" cy="5400675"/>
           </a:xfrm>
           <a:prstGeom prst="rect">
             <a:avLst/>
           </a:prstGeom>
-          <a:solidFill>
-            <a:schemeClr val="accent2">
-              <a:lumMod val="50000"/>
-            </a:schemeClr>
-          </a:solidFill>
         </p:spPr>
-        <p:txBody>
-          <a:bodyPr wrap="square">
-            <a:spAutoFit/>
-          </a:bodyPr>
-          <a:lstStyle/>
-          <a:p>
-            <a:r>
-              <a:rPr lang="en-IN" sz="1200" dirty="0">
-                <a:solidFill>
-                  <a:srgbClr val="C792EA"/>
-                </a:solidFill>
-                <a:latin typeface="Consolas" panose="020B0609020204030204" pitchFamily="49" charset="0"/>
-              </a:rPr>
-              <a:t>private</a:t>
-            </a:r>
-            <a:r>
-              <a:rPr lang="en-IN" sz="1200" dirty="0">
-                <a:solidFill>
-                  <a:srgbClr val="EEFFFF"/>
-                </a:solidFill>
-                <a:latin typeface="Consolas" panose="020B0609020204030204" pitchFamily="49" charset="0"/>
-              </a:rPr>
-              <a:t> </a:t>
-            </a:r>
-            <a:r>
-              <a:rPr lang="en-IN" sz="1200" dirty="0">
-                <a:solidFill>
-                  <a:srgbClr val="C792EA"/>
-                </a:solidFill>
-                <a:latin typeface="Consolas" panose="020B0609020204030204" pitchFamily="49" charset="0"/>
-              </a:rPr>
-              <a:t>static</a:t>
-            </a:r>
-            <a:r>
-              <a:rPr lang="en-IN" sz="1200" dirty="0">
-                <a:solidFill>
-                  <a:srgbClr val="EEFFFF"/>
-                </a:solidFill>
-                <a:latin typeface="Consolas" panose="020B0609020204030204" pitchFamily="49" charset="0"/>
-              </a:rPr>
-              <a:t> </a:t>
-            </a:r>
-            <a:r>
-              <a:rPr lang="en-IN" sz="1200" dirty="0">
-                <a:solidFill>
-                  <a:srgbClr val="C792EA"/>
-                </a:solidFill>
-                <a:latin typeface="Consolas" panose="020B0609020204030204" pitchFamily="49" charset="0"/>
-              </a:rPr>
-              <a:t>void</a:t>
-            </a:r>
-            <a:r>
-              <a:rPr lang="en-IN" sz="1200" dirty="0">
-                <a:solidFill>
-                  <a:srgbClr val="EEFFFF"/>
-                </a:solidFill>
-                <a:latin typeface="Consolas" panose="020B0609020204030204" pitchFamily="49" charset="0"/>
-              </a:rPr>
-              <a:t> </a:t>
-            </a:r>
-            <a:r>
-              <a:rPr lang="en-IN" sz="1200" dirty="0">
-                <a:solidFill>
-                  <a:srgbClr val="82AAFF"/>
-                </a:solidFill>
-                <a:latin typeface="Consolas" panose="020B0609020204030204" pitchFamily="49" charset="0"/>
-              </a:rPr>
-              <a:t>run</a:t>
-            </a:r>
-            <a:r>
-              <a:rPr lang="en-IN" sz="1200" dirty="0">
-                <a:solidFill>
-                  <a:srgbClr val="89DDFF"/>
-                </a:solidFill>
-                <a:latin typeface="Consolas" panose="020B0609020204030204" pitchFamily="49" charset="0"/>
-              </a:rPr>
-              <a:t>(</a:t>
-            </a:r>
-            <a:r>
-              <a:rPr lang="en-IN" sz="1200" dirty="0">
-                <a:solidFill>
-                  <a:srgbClr val="C792EA"/>
-                </a:solidFill>
-                <a:latin typeface="Consolas" panose="020B0609020204030204" pitchFamily="49" charset="0"/>
-              </a:rPr>
-              <a:t>String</a:t>
-            </a:r>
-            <a:r>
-              <a:rPr lang="en-IN" sz="1200" dirty="0">
-                <a:solidFill>
-                  <a:srgbClr val="89DDFF"/>
-                </a:solidFill>
-                <a:latin typeface="Consolas" panose="020B0609020204030204" pitchFamily="49" charset="0"/>
-              </a:rPr>
-              <a:t>[]</a:t>
-            </a:r>
-            <a:r>
-              <a:rPr lang="en-IN" sz="1200" dirty="0">
-                <a:solidFill>
-                  <a:srgbClr val="EEFFFF"/>
-                </a:solidFill>
-                <a:latin typeface="Consolas" panose="020B0609020204030204" pitchFamily="49" charset="0"/>
-              </a:rPr>
-              <a:t> </a:t>
-            </a:r>
-            <a:r>
-              <a:rPr lang="en-IN" sz="1200" dirty="0" err="1">
-                <a:solidFill>
-                  <a:srgbClr val="FF5370"/>
-                </a:solidFill>
-                <a:latin typeface="Consolas" panose="020B0609020204030204" pitchFamily="49" charset="0"/>
-              </a:rPr>
-              <a:t>argv</a:t>
-            </a:r>
-            <a:r>
-              <a:rPr lang="en-IN" sz="1200" dirty="0">
-                <a:solidFill>
-                  <a:srgbClr val="89DDFF"/>
-                </a:solidFill>
-                <a:latin typeface="Consolas" panose="020B0609020204030204" pitchFamily="49" charset="0"/>
-              </a:rPr>
-              <a:t>)</a:t>
-            </a:r>
-            <a:r>
-              <a:rPr lang="en-IN" sz="1200" dirty="0">
-                <a:solidFill>
-                  <a:srgbClr val="EEFFFF"/>
-                </a:solidFill>
-                <a:latin typeface="Consolas" panose="020B0609020204030204" pitchFamily="49" charset="0"/>
-              </a:rPr>
-              <a:t> </a:t>
-            </a:r>
-            <a:r>
-              <a:rPr lang="en-IN" sz="1200" dirty="0">
-                <a:solidFill>
-                  <a:srgbClr val="C792EA"/>
-                </a:solidFill>
-                <a:latin typeface="Consolas" panose="020B0609020204030204" pitchFamily="49" charset="0"/>
-              </a:rPr>
-              <a:t>throws</a:t>
-            </a:r>
-            <a:r>
-              <a:rPr lang="en-IN" sz="1200" dirty="0">
-                <a:solidFill>
-                  <a:srgbClr val="EEFFFF"/>
-                </a:solidFill>
-                <a:latin typeface="Consolas" panose="020B0609020204030204" pitchFamily="49" charset="0"/>
-              </a:rPr>
-              <a:t> </a:t>
-            </a:r>
-            <a:r>
-              <a:rPr lang="en-IN" sz="1200" dirty="0" err="1">
-                <a:solidFill>
-                  <a:srgbClr val="C792EA"/>
-                </a:solidFill>
-                <a:latin typeface="Consolas" panose="020B0609020204030204" pitchFamily="49" charset="0"/>
-              </a:rPr>
-              <a:t>MPIException</a:t>
-            </a:r>
-            <a:endParaRPr lang="en-IN" sz="1200" dirty="0">
-              <a:solidFill>
-                <a:srgbClr val="EEFFFF"/>
-              </a:solidFill>
-              <a:latin typeface="Consolas" panose="020B0609020204030204" pitchFamily="49" charset="0"/>
-            </a:endParaRPr>
-          </a:p>
-          <a:p>
-            <a:r>
-              <a:rPr lang="en-IN" sz="1200" dirty="0">
-                <a:solidFill>
-                  <a:srgbClr val="89DDFF"/>
-                </a:solidFill>
-                <a:latin typeface="Consolas" panose="020B0609020204030204" pitchFamily="49" charset="0"/>
-              </a:rPr>
-              <a:t>{</a:t>
-            </a:r>
-            <a:endParaRPr lang="en-IN" sz="1200" dirty="0">
-              <a:solidFill>
-                <a:srgbClr val="EEFFFF"/>
-              </a:solidFill>
-              <a:latin typeface="Consolas" panose="020B0609020204030204" pitchFamily="49" charset="0"/>
-            </a:endParaRPr>
-          </a:p>
-          <a:p>
-            <a:pPr lvl="1"/>
-            <a:r>
-              <a:rPr lang="en-IN" sz="1200" dirty="0">
-                <a:solidFill>
-                  <a:srgbClr val="C792EA"/>
-                </a:solidFill>
-                <a:latin typeface="Consolas" panose="020B0609020204030204" pitchFamily="49" charset="0"/>
-              </a:rPr>
-              <a:t>int</a:t>
-            </a:r>
-            <a:r>
-              <a:rPr lang="en-IN" sz="1200" dirty="0">
-                <a:solidFill>
-                  <a:srgbClr val="EEFFFF"/>
-                </a:solidFill>
-                <a:latin typeface="Consolas" panose="020B0609020204030204" pitchFamily="49" charset="0"/>
-              </a:rPr>
-              <a:t> n </a:t>
-            </a:r>
-            <a:r>
-              <a:rPr lang="en-IN" sz="1200" dirty="0">
-                <a:solidFill>
-                  <a:srgbClr val="C792EA"/>
-                </a:solidFill>
-                <a:latin typeface="Consolas" panose="020B0609020204030204" pitchFamily="49" charset="0"/>
-              </a:rPr>
-              <a:t>=</a:t>
-            </a:r>
-            <a:r>
-              <a:rPr lang="en-IN" sz="1200" dirty="0">
-                <a:solidFill>
-                  <a:srgbClr val="EEFFFF"/>
-                </a:solidFill>
-                <a:latin typeface="Consolas" panose="020B0609020204030204" pitchFamily="49" charset="0"/>
-              </a:rPr>
-              <a:t> </a:t>
-            </a:r>
-            <a:r>
-              <a:rPr lang="en-IN" sz="1200" dirty="0" err="1">
-                <a:solidFill>
-                  <a:srgbClr val="EEFFFF"/>
-                </a:solidFill>
-                <a:latin typeface="Consolas" panose="020B0609020204030204" pitchFamily="49" charset="0"/>
-              </a:rPr>
-              <a:t>Integer</a:t>
-            </a:r>
-            <a:r>
-              <a:rPr lang="en-IN" sz="1200" dirty="0" err="1">
-                <a:solidFill>
-                  <a:srgbClr val="89DDFF"/>
-                </a:solidFill>
-                <a:latin typeface="Consolas" panose="020B0609020204030204" pitchFamily="49" charset="0"/>
-              </a:rPr>
-              <a:t>.</a:t>
-            </a:r>
-            <a:r>
-              <a:rPr lang="en-IN" sz="1200" dirty="0" err="1">
-                <a:solidFill>
-                  <a:srgbClr val="82AAFF"/>
-                </a:solidFill>
-                <a:latin typeface="Consolas" panose="020B0609020204030204" pitchFamily="49" charset="0"/>
-              </a:rPr>
-              <a:t>parseInt</a:t>
-            </a:r>
-            <a:r>
-              <a:rPr lang="en-IN" sz="1200" dirty="0">
-                <a:solidFill>
-                  <a:srgbClr val="89DDFF"/>
-                </a:solidFill>
-                <a:latin typeface="Consolas" panose="020B0609020204030204" pitchFamily="49" charset="0"/>
-              </a:rPr>
-              <a:t>(</a:t>
-            </a:r>
-            <a:r>
-              <a:rPr lang="en-IN" sz="1200" dirty="0" err="1">
-                <a:solidFill>
-                  <a:srgbClr val="EEFFFF"/>
-                </a:solidFill>
-                <a:latin typeface="Consolas" panose="020B0609020204030204" pitchFamily="49" charset="0"/>
-              </a:rPr>
-              <a:t>argv</a:t>
-            </a:r>
-            <a:r>
-              <a:rPr lang="en-IN" sz="1200" dirty="0">
-                <a:solidFill>
-                  <a:srgbClr val="89DDFF"/>
-                </a:solidFill>
-                <a:latin typeface="Consolas" panose="020B0609020204030204" pitchFamily="49" charset="0"/>
-              </a:rPr>
-              <a:t>[</a:t>
-            </a:r>
-            <a:r>
-              <a:rPr lang="en-IN" sz="1200" dirty="0">
-                <a:solidFill>
-                  <a:srgbClr val="F78C6C"/>
-                </a:solidFill>
-                <a:latin typeface="Consolas" panose="020B0609020204030204" pitchFamily="49" charset="0"/>
-              </a:rPr>
-              <a:t>0</a:t>
-            </a:r>
-            <a:r>
-              <a:rPr lang="en-IN" sz="1200" dirty="0">
-                <a:solidFill>
-                  <a:srgbClr val="89DDFF"/>
-                </a:solidFill>
-                <a:latin typeface="Consolas" panose="020B0609020204030204" pitchFamily="49" charset="0"/>
-              </a:rPr>
-              <a:t>]);</a:t>
-            </a:r>
-            <a:r>
-              <a:rPr lang="en-IN" sz="1200" dirty="0">
-                <a:solidFill>
-                  <a:srgbClr val="EEFFFF"/>
-                </a:solidFill>
-                <a:latin typeface="Consolas" panose="020B0609020204030204" pitchFamily="49" charset="0"/>
-              </a:rPr>
-              <a:t> </a:t>
-            </a:r>
-            <a:r>
-              <a:rPr lang="en-IN" sz="1200" i="1" dirty="0">
-                <a:solidFill>
-                  <a:srgbClr val="546E7A"/>
-                </a:solidFill>
-                <a:latin typeface="Consolas" panose="020B0609020204030204" pitchFamily="49" charset="0"/>
-              </a:rPr>
-              <a:t>// time to wait during annealing steps for the system to stabilize</a:t>
-            </a:r>
-            <a:endParaRPr lang="en-IN" sz="1200" dirty="0">
-              <a:solidFill>
-                <a:srgbClr val="EEFFFF"/>
-              </a:solidFill>
-              <a:latin typeface="Consolas" panose="020B0609020204030204" pitchFamily="49" charset="0"/>
-            </a:endParaRPr>
-          </a:p>
-          <a:p>
-            <a:pPr lvl="1"/>
-            <a:r>
-              <a:rPr lang="en-IN" sz="1200" dirty="0">
-                <a:solidFill>
-                  <a:srgbClr val="C792EA"/>
-                </a:solidFill>
-                <a:latin typeface="Consolas" panose="020B0609020204030204" pitchFamily="49" charset="0"/>
-              </a:rPr>
-              <a:t>Graph</a:t>
-            </a:r>
-            <a:r>
-              <a:rPr lang="en-IN" sz="1200" dirty="0">
-                <a:solidFill>
-                  <a:srgbClr val="EEFFFF"/>
-                </a:solidFill>
-                <a:latin typeface="Consolas" panose="020B0609020204030204" pitchFamily="49" charset="0"/>
-              </a:rPr>
-              <a:t> g </a:t>
-            </a:r>
-            <a:r>
-              <a:rPr lang="en-IN" sz="1200" dirty="0">
-                <a:solidFill>
-                  <a:srgbClr val="C792EA"/>
-                </a:solidFill>
-                <a:latin typeface="Consolas" panose="020B0609020204030204" pitchFamily="49" charset="0"/>
-              </a:rPr>
-              <a:t>=</a:t>
-            </a:r>
-            <a:r>
-              <a:rPr lang="en-IN" sz="1200" dirty="0">
-                <a:solidFill>
-                  <a:srgbClr val="EEFFFF"/>
-                </a:solidFill>
-                <a:latin typeface="Consolas" panose="020B0609020204030204" pitchFamily="49" charset="0"/>
-              </a:rPr>
-              <a:t> </a:t>
-            </a:r>
-            <a:r>
-              <a:rPr lang="en-IN" sz="1200" dirty="0" err="1">
-                <a:solidFill>
-                  <a:srgbClr val="82AAFF"/>
-                </a:solidFill>
-                <a:latin typeface="Consolas" panose="020B0609020204030204" pitchFamily="49" charset="0"/>
-              </a:rPr>
-              <a:t>make_graph</a:t>
-            </a:r>
-            <a:r>
-              <a:rPr lang="en-IN" sz="1200" dirty="0">
-                <a:solidFill>
-                  <a:srgbClr val="89DDFF"/>
-                </a:solidFill>
-                <a:latin typeface="Consolas" panose="020B0609020204030204" pitchFamily="49" charset="0"/>
-              </a:rPr>
-              <a:t>(</a:t>
-            </a:r>
-            <a:r>
-              <a:rPr lang="en-IN" sz="1200" dirty="0" err="1">
-                <a:solidFill>
-                  <a:srgbClr val="82AAFF"/>
-                </a:solidFill>
-                <a:latin typeface="Consolas" panose="020B0609020204030204" pitchFamily="49" charset="0"/>
-              </a:rPr>
-              <a:t>argv</a:t>
-            </a:r>
-            <a:r>
-              <a:rPr lang="en-IN" sz="1200" dirty="0">
-                <a:solidFill>
-                  <a:srgbClr val="89DDFF"/>
-                </a:solidFill>
-                <a:latin typeface="Consolas" panose="020B0609020204030204" pitchFamily="49" charset="0"/>
-              </a:rPr>
-              <a:t>[</a:t>
-            </a:r>
-            <a:r>
-              <a:rPr lang="en-IN" sz="1200" dirty="0">
-                <a:solidFill>
-                  <a:srgbClr val="F78C6C"/>
-                </a:solidFill>
-                <a:latin typeface="Consolas" panose="020B0609020204030204" pitchFamily="49" charset="0"/>
-              </a:rPr>
-              <a:t>1</a:t>
-            </a:r>
-            <a:r>
-              <a:rPr lang="en-IN" sz="1200" dirty="0">
-                <a:solidFill>
-                  <a:srgbClr val="89DDFF"/>
-                </a:solidFill>
-                <a:latin typeface="Consolas" panose="020B0609020204030204" pitchFamily="49" charset="0"/>
-              </a:rPr>
-              <a:t>]);</a:t>
-            </a:r>
-            <a:r>
-              <a:rPr lang="en-IN" sz="1200" dirty="0">
-                <a:solidFill>
-                  <a:srgbClr val="EEFFFF"/>
-                </a:solidFill>
-                <a:latin typeface="Consolas" panose="020B0609020204030204" pitchFamily="49" charset="0"/>
-              </a:rPr>
-              <a:t> </a:t>
-            </a:r>
-            <a:r>
-              <a:rPr lang="en-IN" sz="1200" i="1" dirty="0">
-                <a:solidFill>
-                  <a:srgbClr val="546E7A"/>
-                </a:solidFill>
-                <a:latin typeface="Consolas" panose="020B0609020204030204" pitchFamily="49" charset="0"/>
-              </a:rPr>
-              <a:t>// input graph file</a:t>
-            </a:r>
-            <a:endParaRPr lang="en-IN" sz="1200" dirty="0">
-              <a:solidFill>
-                <a:srgbClr val="EEFFFF"/>
-              </a:solidFill>
-              <a:latin typeface="Consolas" panose="020B0609020204030204" pitchFamily="49" charset="0"/>
-            </a:endParaRPr>
-          </a:p>
-          <a:p>
-            <a:pPr lvl="1"/>
-            <a:br>
-              <a:rPr lang="en-IN" sz="1200" dirty="0">
-                <a:solidFill>
-                  <a:srgbClr val="EEFFFF"/>
-                </a:solidFill>
-                <a:latin typeface="Consolas" panose="020B0609020204030204" pitchFamily="49" charset="0"/>
-              </a:rPr>
-            </a:br>
-            <a:r>
-              <a:rPr lang="en-IN" sz="1200" dirty="0" err="1">
-                <a:solidFill>
-                  <a:srgbClr val="C792EA"/>
-                </a:solidFill>
-                <a:latin typeface="Consolas" panose="020B0609020204030204" pitchFamily="49" charset="0"/>
-              </a:rPr>
-              <a:t>RandomGenerator</a:t>
-            </a:r>
-            <a:r>
-              <a:rPr lang="en-IN" sz="1200" dirty="0">
-                <a:solidFill>
-                  <a:srgbClr val="EEFFFF"/>
-                </a:solidFill>
-                <a:latin typeface="Consolas" panose="020B0609020204030204" pitchFamily="49" charset="0"/>
-              </a:rPr>
-              <a:t> mt19937 </a:t>
-            </a:r>
-            <a:r>
-              <a:rPr lang="en-IN" sz="1200" dirty="0">
-                <a:solidFill>
-                  <a:srgbClr val="C792EA"/>
-                </a:solidFill>
-                <a:latin typeface="Consolas" panose="020B0609020204030204" pitchFamily="49" charset="0"/>
-              </a:rPr>
-              <a:t>=</a:t>
-            </a:r>
-            <a:r>
-              <a:rPr lang="en-IN" sz="1200" dirty="0">
-                <a:solidFill>
-                  <a:srgbClr val="EEFFFF"/>
-                </a:solidFill>
-                <a:latin typeface="Consolas" panose="020B0609020204030204" pitchFamily="49" charset="0"/>
-              </a:rPr>
-              <a:t> </a:t>
-            </a:r>
-            <a:r>
-              <a:rPr lang="en-IN" sz="1200" i="1" dirty="0">
-                <a:solidFill>
-                  <a:srgbClr val="89DDFF"/>
-                </a:solidFill>
-                <a:latin typeface="Consolas" panose="020B0609020204030204" pitchFamily="49" charset="0"/>
-              </a:rPr>
-              <a:t>new</a:t>
-            </a:r>
-            <a:r>
-              <a:rPr lang="en-IN" sz="1200" dirty="0">
-                <a:solidFill>
-                  <a:srgbClr val="EEFFFF"/>
-                </a:solidFill>
-                <a:latin typeface="Consolas" panose="020B0609020204030204" pitchFamily="49" charset="0"/>
-              </a:rPr>
-              <a:t> </a:t>
-            </a:r>
-            <a:r>
-              <a:rPr lang="en-IN" sz="1200" dirty="0" err="1">
-                <a:solidFill>
-                  <a:srgbClr val="82AAFF"/>
-                </a:solidFill>
-                <a:latin typeface="Consolas" panose="020B0609020204030204" pitchFamily="49" charset="0"/>
-              </a:rPr>
-              <a:t>MersenneTwister</a:t>
-            </a:r>
-            <a:r>
-              <a:rPr lang="en-IN" sz="1200" dirty="0">
-                <a:solidFill>
-                  <a:srgbClr val="89DDFF"/>
-                </a:solidFill>
-                <a:latin typeface="Consolas" panose="020B0609020204030204" pitchFamily="49" charset="0"/>
-              </a:rPr>
-              <a:t>(</a:t>
-            </a:r>
-            <a:r>
-              <a:rPr lang="en-IN" sz="1200" dirty="0">
-                <a:solidFill>
-                  <a:srgbClr val="F78C6C"/>
-                </a:solidFill>
-                <a:latin typeface="Consolas" panose="020B0609020204030204" pitchFamily="49" charset="0"/>
-              </a:rPr>
-              <a:t>60</a:t>
-            </a:r>
-            <a:r>
-              <a:rPr lang="en-IN" sz="1200" dirty="0">
-                <a:solidFill>
-                  <a:srgbClr val="82AAFF"/>
-                </a:solidFill>
-                <a:latin typeface="Consolas" panose="020B0609020204030204" pitchFamily="49" charset="0"/>
-              </a:rPr>
-              <a:t> </a:t>
-            </a:r>
-            <a:r>
-              <a:rPr lang="en-IN" sz="1200" dirty="0">
-                <a:solidFill>
-                  <a:srgbClr val="C792EA"/>
-                </a:solidFill>
-                <a:latin typeface="Consolas" panose="020B0609020204030204" pitchFamily="49" charset="0"/>
-              </a:rPr>
-              <a:t>*</a:t>
-            </a:r>
-            <a:r>
-              <a:rPr lang="en-IN" sz="1200" dirty="0">
-                <a:solidFill>
-                  <a:srgbClr val="82AAFF"/>
-                </a:solidFill>
-                <a:latin typeface="Consolas" panose="020B0609020204030204" pitchFamily="49" charset="0"/>
-              </a:rPr>
-              <a:t> </a:t>
-            </a:r>
-            <a:r>
-              <a:rPr lang="en-IN" sz="1200" dirty="0" err="1">
-                <a:solidFill>
-                  <a:srgbClr val="EEFFFF"/>
-                </a:solidFill>
-                <a:latin typeface="Consolas" panose="020B0609020204030204" pitchFamily="49" charset="0"/>
-              </a:rPr>
-              <a:t>MPI</a:t>
-            </a:r>
-            <a:r>
-              <a:rPr lang="en-IN" sz="1200" dirty="0" err="1">
-                <a:solidFill>
-                  <a:srgbClr val="89DDFF"/>
-                </a:solidFill>
-                <a:latin typeface="Consolas" panose="020B0609020204030204" pitchFamily="49" charset="0"/>
-              </a:rPr>
-              <a:t>.</a:t>
-            </a:r>
-            <a:r>
-              <a:rPr lang="en-IN" sz="1200" dirty="0" err="1">
-                <a:solidFill>
-                  <a:srgbClr val="EEFFFF"/>
-                </a:solidFill>
-                <a:latin typeface="Consolas" panose="020B0609020204030204" pitchFamily="49" charset="0"/>
-              </a:rPr>
-              <a:t>COMM_WORLD</a:t>
-            </a:r>
-            <a:r>
-              <a:rPr lang="en-IN" sz="1200" dirty="0" err="1">
-                <a:solidFill>
-                  <a:srgbClr val="89DDFF"/>
-                </a:solidFill>
-                <a:latin typeface="Consolas" panose="020B0609020204030204" pitchFamily="49" charset="0"/>
-              </a:rPr>
-              <a:t>.</a:t>
-            </a:r>
-            <a:r>
-              <a:rPr lang="en-IN" sz="1200" dirty="0" err="1">
-                <a:solidFill>
-                  <a:srgbClr val="82AAFF"/>
-                </a:solidFill>
-                <a:latin typeface="Consolas" panose="020B0609020204030204" pitchFamily="49" charset="0"/>
-              </a:rPr>
-              <a:t>Rank</a:t>
-            </a:r>
-            <a:r>
-              <a:rPr lang="en-IN" sz="1200" dirty="0">
-                <a:solidFill>
-                  <a:srgbClr val="89DDFF"/>
-                </a:solidFill>
-                <a:latin typeface="Consolas" panose="020B0609020204030204" pitchFamily="49" charset="0"/>
-              </a:rPr>
-              <a:t>());</a:t>
-            </a:r>
-            <a:r>
-              <a:rPr lang="en-IN" sz="1200" dirty="0">
-                <a:solidFill>
-                  <a:srgbClr val="EEFFFF"/>
-                </a:solidFill>
-                <a:latin typeface="Consolas" panose="020B0609020204030204" pitchFamily="49" charset="0"/>
-              </a:rPr>
-              <a:t> </a:t>
-            </a:r>
-            <a:r>
-              <a:rPr lang="en-IN" sz="1200" i="1" dirty="0">
-                <a:solidFill>
-                  <a:srgbClr val="546E7A"/>
-                </a:solidFill>
-                <a:latin typeface="Consolas" panose="020B0609020204030204" pitchFamily="49" charset="0"/>
-              </a:rPr>
-              <a:t>// random engine</a:t>
-            </a:r>
-            <a:endParaRPr lang="en-IN" sz="1200" dirty="0">
-              <a:solidFill>
-                <a:srgbClr val="EEFFFF"/>
-              </a:solidFill>
-              <a:latin typeface="Consolas" panose="020B0609020204030204" pitchFamily="49" charset="0"/>
-            </a:endParaRPr>
-          </a:p>
-          <a:p>
-            <a:pPr lvl="1"/>
-            <a:r>
-              <a:rPr lang="en-IN" sz="1200" dirty="0" err="1">
-                <a:solidFill>
-                  <a:srgbClr val="C792EA"/>
-                </a:solidFill>
-                <a:latin typeface="Consolas" panose="020B0609020204030204" pitchFamily="49" charset="0"/>
-              </a:rPr>
-              <a:t>RandomDataGenerator</a:t>
-            </a:r>
-            <a:r>
-              <a:rPr lang="en-IN" sz="1200" dirty="0">
-                <a:solidFill>
-                  <a:srgbClr val="EEFFFF"/>
-                </a:solidFill>
-                <a:latin typeface="Consolas" panose="020B0609020204030204" pitchFamily="49" charset="0"/>
-              </a:rPr>
-              <a:t> </a:t>
-            </a:r>
-            <a:r>
-              <a:rPr lang="en-IN" sz="1200" dirty="0" err="1">
-                <a:solidFill>
-                  <a:srgbClr val="EEFFFF"/>
-                </a:solidFill>
-                <a:latin typeface="Consolas" panose="020B0609020204030204" pitchFamily="49" charset="0"/>
-              </a:rPr>
-              <a:t>rng</a:t>
-            </a:r>
-            <a:r>
-              <a:rPr lang="en-IN" sz="1200" dirty="0">
-                <a:solidFill>
-                  <a:srgbClr val="EEFFFF"/>
-                </a:solidFill>
-                <a:latin typeface="Consolas" panose="020B0609020204030204" pitchFamily="49" charset="0"/>
-              </a:rPr>
-              <a:t> </a:t>
-            </a:r>
-            <a:r>
-              <a:rPr lang="en-IN" sz="1200" dirty="0">
-                <a:solidFill>
-                  <a:srgbClr val="C792EA"/>
-                </a:solidFill>
-                <a:latin typeface="Consolas" panose="020B0609020204030204" pitchFamily="49" charset="0"/>
-              </a:rPr>
-              <a:t>=</a:t>
-            </a:r>
-            <a:r>
-              <a:rPr lang="en-IN" sz="1200" dirty="0">
-                <a:solidFill>
-                  <a:srgbClr val="EEFFFF"/>
-                </a:solidFill>
-                <a:latin typeface="Consolas" panose="020B0609020204030204" pitchFamily="49" charset="0"/>
-              </a:rPr>
-              <a:t> </a:t>
-            </a:r>
-            <a:r>
-              <a:rPr lang="en-IN" sz="1200" i="1" dirty="0">
-                <a:solidFill>
-                  <a:srgbClr val="89DDFF"/>
-                </a:solidFill>
-                <a:latin typeface="Consolas" panose="020B0609020204030204" pitchFamily="49" charset="0"/>
-              </a:rPr>
-              <a:t>new</a:t>
-            </a:r>
-            <a:r>
-              <a:rPr lang="en-IN" sz="1200" dirty="0">
-                <a:solidFill>
-                  <a:srgbClr val="EEFFFF"/>
-                </a:solidFill>
-                <a:latin typeface="Consolas" panose="020B0609020204030204" pitchFamily="49" charset="0"/>
-              </a:rPr>
-              <a:t> </a:t>
-            </a:r>
-            <a:r>
-              <a:rPr lang="en-IN" sz="1200" dirty="0" err="1">
-                <a:solidFill>
-                  <a:srgbClr val="82AAFF"/>
-                </a:solidFill>
-                <a:latin typeface="Consolas" panose="020B0609020204030204" pitchFamily="49" charset="0"/>
-              </a:rPr>
-              <a:t>RandomDataGenerator</a:t>
-            </a:r>
-            <a:r>
-              <a:rPr lang="en-IN" sz="1200" dirty="0">
-                <a:solidFill>
-                  <a:srgbClr val="89DDFF"/>
-                </a:solidFill>
-                <a:latin typeface="Consolas" panose="020B0609020204030204" pitchFamily="49" charset="0"/>
-              </a:rPr>
-              <a:t>(</a:t>
-            </a:r>
-            <a:r>
-              <a:rPr lang="en-IN" sz="1200" dirty="0">
-                <a:solidFill>
-                  <a:srgbClr val="82AAFF"/>
-                </a:solidFill>
-                <a:latin typeface="Consolas" panose="020B0609020204030204" pitchFamily="49" charset="0"/>
-              </a:rPr>
-              <a:t>mt19937</a:t>
-            </a:r>
-            <a:r>
-              <a:rPr lang="en-IN" sz="1200" dirty="0">
-                <a:solidFill>
-                  <a:srgbClr val="89DDFF"/>
-                </a:solidFill>
-                <a:latin typeface="Consolas" panose="020B0609020204030204" pitchFamily="49" charset="0"/>
-              </a:rPr>
-              <a:t>);</a:t>
-            </a:r>
-            <a:r>
-              <a:rPr lang="en-IN" sz="1200" dirty="0">
-                <a:solidFill>
-                  <a:srgbClr val="EEFFFF"/>
-                </a:solidFill>
-                <a:latin typeface="Consolas" panose="020B0609020204030204" pitchFamily="49" charset="0"/>
-              </a:rPr>
-              <a:t> </a:t>
-            </a:r>
-            <a:r>
-              <a:rPr lang="en-IN" sz="1200" i="1" dirty="0">
-                <a:solidFill>
-                  <a:srgbClr val="546E7A"/>
-                </a:solidFill>
-                <a:latin typeface="Consolas" panose="020B0609020204030204" pitchFamily="49" charset="0"/>
-              </a:rPr>
-              <a:t>// RNG used by annealing</a:t>
-            </a:r>
-            <a:endParaRPr lang="en-IN" sz="1200" dirty="0">
-              <a:solidFill>
-                <a:srgbClr val="EEFFFF"/>
-              </a:solidFill>
-              <a:latin typeface="Consolas" panose="020B0609020204030204" pitchFamily="49" charset="0"/>
-            </a:endParaRPr>
-          </a:p>
-          <a:p>
-            <a:pPr lvl="1"/>
-            <a:br>
-              <a:rPr lang="en-IN" sz="1200" dirty="0">
-                <a:solidFill>
-                  <a:srgbClr val="EEFFFF"/>
-                </a:solidFill>
-                <a:latin typeface="Consolas" panose="020B0609020204030204" pitchFamily="49" charset="0"/>
-              </a:rPr>
-            </a:br>
-            <a:r>
-              <a:rPr lang="en-IN" sz="1200" dirty="0">
-                <a:solidFill>
-                  <a:srgbClr val="C792EA"/>
-                </a:solidFill>
-                <a:latin typeface="Consolas" panose="020B0609020204030204" pitchFamily="49" charset="0"/>
-              </a:rPr>
-              <a:t>SA_MPI</a:t>
-            </a:r>
-            <a:r>
-              <a:rPr lang="en-IN" sz="1200" dirty="0">
-                <a:solidFill>
-                  <a:srgbClr val="EEFFFF"/>
-                </a:solidFill>
-                <a:latin typeface="Consolas" panose="020B0609020204030204" pitchFamily="49" charset="0"/>
-              </a:rPr>
-              <a:t> SA </a:t>
-            </a:r>
-            <a:r>
-              <a:rPr lang="en-IN" sz="1200" dirty="0">
-                <a:solidFill>
-                  <a:srgbClr val="C792EA"/>
-                </a:solidFill>
-                <a:latin typeface="Consolas" panose="020B0609020204030204" pitchFamily="49" charset="0"/>
-              </a:rPr>
-              <a:t>=</a:t>
-            </a:r>
-            <a:r>
-              <a:rPr lang="en-IN" sz="1200" dirty="0">
-                <a:solidFill>
-                  <a:srgbClr val="EEFFFF"/>
-                </a:solidFill>
-                <a:latin typeface="Consolas" panose="020B0609020204030204" pitchFamily="49" charset="0"/>
-              </a:rPr>
-              <a:t> </a:t>
-            </a:r>
-            <a:r>
-              <a:rPr lang="en-IN" sz="1200" i="1" dirty="0">
-                <a:solidFill>
-                  <a:srgbClr val="89DDFF"/>
-                </a:solidFill>
-                <a:latin typeface="Consolas" panose="020B0609020204030204" pitchFamily="49" charset="0"/>
-              </a:rPr>
-              <a:t>new</a:t>
-            </a:r>
-            <a:r>
-              <a:rPr lang="en-IN" sz="1200" dirty="0">
-                <a:solidFill>
-                  <a:srgbClr val="EEFFFF"/>
-                </a:solidFill>
-                <a:latin typeface="Consolas" panose="020B0609020204030204" pitchFamily="49" charset="0"/>
-              </a:rPr>
-              <a:t> </a:t>
-            </a:r>
-            <a:r>
-              <a:rPr lang="en-IN" sz="1200" dirty="0">
-                <a:solidFill>
-                  <a:srgbClr val="82AAFF"/>
-                </a:solidFill>
-                <a:latin typeface="Consolas" panose="020B0609020204030204" pitchFamily="49" charset="0"/>
-              </a:rPr>
-              <a:t>SA_MPI</a:t>
-            </a:r>
-            <a:r>
-              <a:rPr lang="en-IN" sz="1200" dirty="0">
-                <a:solidFill>
-                  <a:srgbClr val="89DDFF"/>
-                </a:solidFill>
-                <a:latin typeface="Consolas" panose="020B0609020204030204" pitchFamily="49" charset="0"/>
-              </a:rPr>
-              <a:t>(</a:t>
-            </a:r>
-            <a:r>
-              <a:rPr lang="en-IN" sz="1200" dirty="0" err="1">
-                <a:solidFill>
-                  <a:srgbClr val="EEFFFF"/>
-                </a:solidFill>
-                <a:latin typeface="Consolas" panose="020B0609020204030204" pitchFamily="49" charset="0"/>
-              </a:rPr>
-              <a:t>MPI</a:t>
-            </a:r>
-            <a:r>
-              <a:rPr lang="en-IN" sz="1200" dirty="0" err="1">
-                <a:solidFill>
-                  <a:srgbClr val="89DDFF"/>
-                </a:solidFill>
-                <a:latin typeface="Consolas" panose="020B0609020204030204" pitchFamily="49" charset="0"/>
-              </a:rPr>
-              <a:t>.</a:t>
-            </a:r>
-            <a:r>
-              <a:rPr lang="en-IN" sz="1200" dirty="0" err="1">
-                <a:solidFill>
-                  <a:srgbClr val="EEFFFF"/>
-                </a:solidFill>
-                <a:latin typeface="Consolas" panose="020B0609020204030204" pitchFamily="49" charset="0"/>
-              </a:rPr>
-              <a:t>COMM_WORLD</a:t>
-            </a:r>
-            <a:r>
-              <a:rPr lang="en-IN" sz="1200" dirty="0" err="1">
-                <a:solidFill>
-                  <a:srgbClr val="89DDFF"/>
-                </a:solidFill>
-                <a:latin typeface="Consolas" panose="020B0609020204030204" pitchFamily="49" charset="0"/>
-              </a:rPr>
-              <a:t>.</a:t>
-            </a:r>
-            <a:r>
-              <a:rPr lang="en-IN" sz="1200" dirty="0" err="1">
-                <a:solidFill>
-                  <a:srgbClr val="82AAFF"/>
-                </a:solidFill>
-                <a:latin typeface="Consolas" panose="020B0609020204030204" pitchFamily="49" charset="0"/>
-              </a:rPr>
-              <a:t>Rank</a:t>
-            </a:r>
-            <a:r>
-              <a:rPr lang="en-IN" sz="1200" dirty="0">
-                <a:solidFill>
-                  <a:srgbClr val="89DDFF"/>
-                </a:solidFill>
-                <a:latin typeface="Consolas" panose="020B0609020204030204" pitchFamily="49" charset="0"/>
-              </a:rPr>
-              <a:t>(),</a:t>
-            </a:r>
-            <a:r>
-              <a:rPr lang="en-IN" sz="1200" dirty="0">
-                <a:solidFill>
-                  <a:srgbClr val="82AAFF"/>
-                </a:solidFill>
-                <a:latin typeface="Consolas" panose="020B0609020204030204" pitchFamily="49" charset="0"/>
-              </a:rPr>
-              <a:t> </a:t>
-            </a:r>
-            <a:r>
-              <a:rPr lang="en-IN" sz="1200" dirty="0" err="1">
-                <a:solidFill>
-                  <a:srgbClr val="EEFFFF"/>
-                </a:solidFill>
-                <a:latin typeface="Consolas" panose="020B0609020204030204" pitchFamily="49" charset="0"/>
-              </a:rPr>
-              <a:t>MPI</a:t>
-            </a:r>
-            <a:r>
-              <a:rPr lang="en-IN" sz="1200" dirty="0" err="1">
-                <a:solidFill>
-                  <a:srgbClr val="89DDFF"/>
-                </a:solidFill>
-                <a:latin typeface="Consolas" panose="020B0609020204030204" pitchFamily="49" charset="0"/>
-              </a:rPr>
-              <a:t>.</a:t>
-            </a:r>
-            <a:r>
-              <a:rPr lang="en-IN" sz="1200" dirty="0" err="1">
-                <a:solidFill>
-                  <a:srgbClr val="EEFFFF"/>
-                </a:solidFill>
-                <a:latin typeface="Consolas" panose="020B0609020204030204" pitchFamily="49" charset="0"/>
-              </a:rPr>
-              <a:t>COMM_WORLD</a:t>
-            </a:r>
-            <a:r>
-              <a:rPr lang="en-IN" sz="1200" dirty="0" err="1">
-                <a:solidFill>
-                  <a:srgbClr val="89DDFF"/>
-                </a:solidFill>
-                <a:latin typeface="Consolas" panose="020B0609020204030204" pitchFamily="49" charset="0"/>
-              </a:rPr>
-              <a:t>.</a:t>
-            </a:r>
-            <a:r>
-              <a:rPr lang="en-IN" sz="1200" dirty="0" err="1">
-                <a:solidFill>
-                  <a:srgbClr val="82AAFF"/>
-                </a:solidFill>
-                <a:latin typeface="Consolas" panose="020B0609020204030204" pitchFamily="49" charset="0"/>
-              </a:rPr>
-              <a:t>Size</a:t>
-            </a:r>
-            <a:r>
-              <a:rPr lang="en-IN" sz="1200" dirty="0">
-                <a:solidFill>
-                  <a:srgbClr val="89DDFF"/>
-                </a:solidFill>
-                <a:latin typeface="Consolas" panose="020B0609020204030204" pitchFamily="49" charset="0"/>
-              </a:rPr>
-              <a:t>());</a:t>
-            </a:r>
-            <a:endParaRPr lang="en-IN" sz="1200" dirty="0">
-              <a:solidFill>
-                <a:srgbClr val="EEFFFF"/>
-              </a:solidFill>
-              <a:latin typeface="Consolas" panose="020B0609020204030204" pitchFamily="49" charset="0"/>
-            </a:endParaRPr>
-          </a:p>
-          <a:p>
-            <a:pPr lvl="1"/>
-            <a:r>
-              <a:rPr lang="en-IN" sz="1200" dirty="0">
-                <a:solidFill>
-                  <a:srgbClr val="C792EA"/>
-                </a:solidFill>
-                <a:latin typeface="Consolas" panose="020B0609020204030204" pitchFamily="49" charset="0"/>
-              </a:rPr>
-              <a:t>long</a:t>
-            </a:r>
-            <a:r>
-              <a:rPr lang="en-IN" sz="1200" dirty="0">
-                <a:solidFill>
-                  <a:srgbClr val="EEFFFF"/>
-                </a:solidFill>
-                <a:latin typeface="Consolas" panose="020B0609020204030204" pitchFamily="49" charset="0"/>
-              </a:rPr>
-              <a:t> time </a:t>
-            </a:r>
-            <a:r>
-              <a:rPr lang="en-IN" sz="1200" dirty="0">
-                <a:solidFill>
-                  <a:srgbClr val="C792EA"/>
-                </a:solidFill>
-                <a:latin typeface="Consolas" panose="020B0609020204030204" pitchFamily="49" charset="0"/>
-              </a:rPr>
-              <a:t>=</a:t>
-            </a:r>
-            <a:r>
-              <a:rPr lang="en-IN" sz="1200" dirty="0">
-                <a:solidFill>
-                  <a:srgbClr val="EEFFFF"/>
-                </a:solidFill>
-                <a:latin typeface="Consolas" panose="020B0609020204030204" pitchFamily="49" charset="0"/>
-              </a:rPr>
-              <a:t> </a:t>
-            </a:r>
-            <a:r>
-              <a:rPr lang="en-IN" sz="1200" dirty="0" err="1">
-                <a:solidFill>
-                  <a:srgbClr val="EEFFFF"/>
-                </a:solidFill>
-                <a:latin typeface="Consolas" panose="020B0609020204030204" pitchFamily="49" charset="0"/>
-              </a:rPr>
-              <a:t>System</a:t>
-            </a:r>
-            <a:r>
-              <a:rPr lang="en-IN" sz="1200" dirty="0" err="1">
-                <a:solidFill>
-                  <a:srgbClr val="89DDFF"/>
-                </a:solidFill>
-                <a:latin typeface="Consolas" panose="020B0609020204030204" pitchFamily="49" charset="0"/>
-              </a:rPr>
-              <a:t>.</a:t>
-            </a:r>
-            <a:r>
-              <a:rPr lang="en-IN" sz="1200" dirty="0" err="1">
-                <a:solidFill>
-                  <a:srgbClr val="82AAFF"/>
-                </a:solidFill>
-                <a:latin typeface="Consolas" panose="020B0609020204030204" pitchFamily="49" charset="0"/>
-              </a:rPr>
-              <a:t>currentTimeMillis</a:t>
-            </a:r>
-            <a:r>
-              <a:rPr lang="en-IN" sz="1200" dirty="0">
-                <a:solidFill>
-                  <a:srgbClr val="89DDFF"/>
-                </a:solidFill>
-                <a:latin typeface="Consolas" panose="020B0609020204030204" pitchFamily="49" charset="0"/>
-              </a:rPr>
-              <a:t>();</a:t>
-            </a:r>
-            <a:endParaRPr lang="en-IN" sz="1200" dirty="0">
-              <a:solidFill>
-                <a:srgbClr val="EEFFFF"/>
-              </a:solidFill>
-              <a:latin typeface="Consolas" panose="020B0609020204030204" pitchFamily="49" charset="0"/>
-            </a:endParaRPr>
-          </a:p>
-          <a:p>
-            <a:pPr lvl="1"/>
-            <a:br>
-              <a:rPr lang="en-IN" sz="1200" dirty="0">
-                <a:solidFill>
-                  <a:srgbClr val="EEFFFF"/>
-                </a:solidFill>
-                <a:latin typeface="Consolas" panose="020B0609020204030204" pitchFamily="49" charset="0"/>
-              </a:rPr>
-            </a:br>
-            <a:r>
-              <a:rPr lang="en-IN" sz="1200" dirty="0">
-                <a:solidFill>
-                  <a:srgbClr val="C792EA"/>
-                </a:solidFill>
-                <a:latin typeface="Consolas" panose="020B0609020204030204" pitchFamily="49" charset="0"/>
-              </a:rPr>
-              <a:t>Solution</a:t>
-            </a:r>
-            <a:r>
-              <a:rPr lang="en-IN" sz="1200" dirty="0">
-                <a:solidFill>
-                  <a:srgbClr val="EEFFFF"/>
-                </a:solidFill>
-                <a:latin typeface="Consolas" panose="020B0609020204030204" pitchFamily="49" charset="0"/>
-              </a:rPr>
-              <a:t> x </a:t>
-            </a:r>
-            <a:r>
-              <a:rPr lang="en-IN" sz="1200" dirty="0">
-                <a:solidFill>
-                  <a:srgbClr val="C792EA"/>
-                </a:solidFill>
-                <a:latin typeface="Consolas" panose="020B0609020204030204" pitchFamily="49" charset="0"/>
-              </a:rPr>
-              <a:t>=</a:t>
-            </a:r>
-            <a:r>
-              <a:rPr lang="en-IN" sz="1200" dirty="0">
-                <a:solidFill>
-                  <a:srgbClr val="EEFFFF"/>
-                </a:solidFill>
-                <a:latin typeface="Consolas" panose="020B0609020204030204" pitchFamily="49" charset="0"/>
-              </a:rPr>
-              <a:t> </a:t>
-            </a:r>
-            <a:r>
-              <a:rPr lang="en-IN" sz="1200" dirty="0" err="1">
-                <a:solidFill>
-                  <a:srgbClr val="EEFFFF"/>
-                </a:solidFill>
-                <a:latin typeface="Consolas" panose="020B0609020204030204" pitchFamily="49" charset="0"/>
-              </a:rPr>
-              <a:t>SA</a:t>
-            </a:r>
-            <a:r>
-              <a:rPr lang="en-IN" sz="1200" dirty="0" err="1">
-                <a:solidFill>
-                  <a:srgbClr val="89DDFF"/>
-                </a:solidFill>
-                <a:latin typeface="Consolas" panose="020B0609020204030204" pitchFamily="49" charset="0"/>
-              </a:rPr>
-              <a:t>.</a:t>
-            </a:r>
-            <a:r>
-              <a:rPr lang="en-IN" sz="1200" dirty="0" err="1">
-                <a:solidFill>
-                  <a:srgbClr val="82AAFF"/>
-                </a:solidFill>
-                <a:latin typeface="Consolas" panose="020B0609020204030204" pitchFamily="49" charset="0"/>
-              </a:rPr>
-              <a:t>simulated_annealing</a:t>
-            </a:r>
-            <a:r>
-              <a:rPr lang="en-IN" sz="1200" dirty="0">
-                <a:solidFill>
-                  <a:srgbClr val="89DDFF"/>
-                </a:solidFill>
-                <a:latin typeface="Consolas" panose="020B0609020204030204" pitchFamily="49" charset="0"/>
-              </a:rPr>
-              <a:t>(</a:t>
-            </a:r>
-            <a:r>
-              <a:rPr lang="en-IN" sz="1200" dirty="0">
-                <a:solidFill>
-                  <a:srgbClr val="EEFFFF"/>
-                </a:solidFill>
-                <a:latin typeface="Consolas" panose="020B0609020204030204" pitchFamily="49" charset="0"/>
-              </a:rPr>
-              <a:t>g</a:t>
-            </a:r>
-            <a:r>
-              <a:rPr lang="en-IN" sz="1200" dirty="0">
-                <a:solidFill>
-                  <a:srgbClr val="89DDFF"/>
-                </a:solidFill>
-                <a:latin typeface="Consolas" panose="020B0609020204030204" pitchFamily="49" charset="0"/>
-              </a:rPr>
-              <a:t>,</a:t>
-            </a:r>
-            <a:r>
-              <a:rPr lang="en-IN" sz="1200" dirty="0">
-                <a:solidFill>
-                  <a:srgbClr val="EEFFFF"/>
-                </a:solidFill>
-                <a:latin typeface="Consolas" panose="020B0609020204030204" pitchFamily="49" charset="0"/>
-              </a:rPr>
-              <a:t> n</a:t>
-            </a:r>
-            <a:r>
-              <a:rPr lang="en-IN" sz="1200" dirty="0">
-                <a:solidFill>
-                  <a:srgbClr val="89DDFF"/>
-                </a:solidFill>
-                <a:latin typeface="Consolas" panose="020B0609020204030204" pitchFamily="49" charset="0"/>
-              </a:rPr>
-              <a:t>,</a:t>
-            </a:r>
-            <a:r>
-              <a:rPr lang="en-IN" sz="1200" dirty="0">
-                <a:solidFill>
-                  <a:srgbClr val="EEFFFF"/>
-                </a:solidFill>
-                <a:latin typeface="Consolas" panose="020B0609020204030204" pitchFamily="49" charset="0"/>
-              </a:rPr>
-              <a:t> </a:t>
-            </a:r>
-            <a:r>
-              <a:rPr lang="en-IN" sz="1200" dirty="0" err="1">
-                <a:solidFill>
-                  <a:srgbClr val="EEFFFF"/>
-                </a:solidFill>
-                <a:latin typeface="Consolas" panose="020B0609020204030204" pitchFamily="49" charset="0"/>
-              </a:rPr>
-              <a:t>rng</a:t>
-            </a:r>
-            <a:r>
-              <a:rPr lang="en-IN" sz="1200" dirty="0">
-                <a:solidFill>
-                  <a:srgbClr val="89DDFF"/>
-                </a:solidFill>
-                <a:latin typeface="Consolas" panose="020B0609020204030204" pitchFamily="49" charset="0"/>
-              </a:rPr>
-              <a:t>);</a:t>
-            </a:r>
-            <a:endParaRPr lang="en-IN" sz="1200" dirty="0">
-              <a:solidFill>
-                <a:srgbClr val="EEFFFF"/>
-              </a:solidFill>
-              <a:latin typeface="Consolas" panose="020B0609020204030204" pitchFamily="49" charset="0"/>
-            </a:endParaRPr>
-          </a:p>
-          <a:p>
-            <a:pPr lvl="1"/>
-            <a:r>
-              <a:rPr lang="en-IN" sz="1200" dirty="0">
-                <a:solidFill>
-                  <a:srgbClr val="EEFFFF"/>
-                </a:solidFill>
-                <a:latin typeface="Consolas" panose="020B0609020204030204" pitchFamily="49" charset="0"/>
-              </a:rPr>
-              <a:t>time </a:t>
-            </a:r>
-            <a:r>
-              <a:rPr lang="en-IN" sz="1200" dirty="0">
-                <a:solidFill>
-                  <a:srgbClr val="C792EA"/>
-                </a:solidFill>
-                <a:latin typeface="Consolas" panose="020B0609020204030204" pitchFamily="49" charset="0"/>
-              </a:rPr>
-              <a:t>=</a:t>
-            </a:r>
-            <a:r>
-              <a:rPr lang="en-IN" sz="1200" dirty="0">
-                <a:solidFill>
-                  <a:srgbClr val="EEFFFF"/>
-                </a:solidFill>
-                <a:latin typeface="Consolas" panose="020B0609020204030204" pitchFamily="49" charset="0"/>
-              </a:rPr>
-              <a:t> </a:t>
-            </a:r>
-            <a:r>
-              <a:rPr lang="en-IN" sz="1200" dirty="0" err="1">
-                <a:solidFill>
-                  <a:srgbClr val="EEFFFF"/>
-                </a:solidFill>
-                <a:latin typeface="Consolas" panose="020B0609020204030204" pitchFamily="49" charset="0"/>
-              </a:rPr>
-              <a:t>System</a:t>
-            </a:r>
-            <a:r>
-              <a:rPr lang="en-IN" sz="1200" dirty="0" err="1">
-                <a:solidFill>
-                  <a:srgbClr val="89DDFF"/>
-                </a:solidFill>
-                <a:latin typeface="Consolas" panose="020B0609020204030204" pitchFamily="49" charset="0"/>
-              </a:rPr>
-              <a:t>.</a:t>
-            </a:r>
-            <a:r>
-              <a:rPr lang="en-IN" sz="1200" dirty="0" err="1">
-                <a:solidFill>
-                  <a:srgbClr val="82AAFF"/>
-                </a:solidFill>
-                <a:latin typeface="Consolas" panose="020B0609020204030204" pitchFamily="49" charset="0"/>
-              </a:rPr>
-              <a:t>currentTimeMillis</a:t>
-            </a:r>
-            <a:r>
-              <a:rPr lang="en-IN" sz="1200" dirty="0">
-                <a:solidFill>
-                  <a:srgbClr val="89DDFF"/>
-                </a:solidFill>
-                <a:latin typeface="Consolas" panose="020B0609020204030204" pitchFamily="49" charset="0"/>
-              </a:rPr>
-              <a:t>()</a:t>
-            </a:r>
-            <a:r>
-              <a:rPr lang="en-IN" sz="1200" dirty="0">
-                <a:solidFill>
-                  <a:srgbClr val="EEFFFF"/>
-                </a:solidFill>
-                <a:latin typeface="Consolas" panose="020B0609020204030204" pitchFamily="49" charset="0"/>
-              </a:rPr>
-              <a:t> </a:t>
-            </a:r>
-            <a:r>
-              <a:rPr lang="en-IN" sz="1200" dirty="0">
-                <a:solidFill>
-                  <a:srgbClr val="C792EA"/>
-                </a:solidFill>
-                <a:latin typeface="Consolas" panose="020B0609020204030204" pitchFamily="49" charset="0"/>
-              </a:rPr>
-              <a:t>-</a:t>
-            </a:r>
-            <a:r>
-              <a:rPr lang="en-IN" sz="1200" dirty="0">
-                <a:solidFill>
-                  <a:srgbClr val="EEFFFF"/>
-                </a:solidFill>
-                <a:latin typeface="Consolas" panose="020B0609020204030204" pitchFamily="49" charset="0"/>
-              </a:rPr>
-              <a:t> time</a:t>
-            </a:r>
-            <a:r>
-              <a:rPr lang="en-IN" sz="1200" dirty="0">
-                <a:solidFill>
-                  <a:srgbClr val="89DDFF"/>
-                </a:solidFill>
-                <a:latin typeface="Consolas" panose="020B0609020204030204" pitchFamily="49" charset="0"/>
-              </a:rPr>
-              <a:t>;</a:t>
-            </a:r>
-            <a:endParaRPr lang="en-IN" sz="1200" dirty="0">
-              <a:solidFill>
-                <a:srgbClr val="EEFFFF"/>
-              </a:solidFill>
-              <a:latin typeface="Consolas" panose="020B0609020204030204" pitchFamily="49" charset="0"/>
-            </a:endParaRPr>
-          </a:p>
-          <a:p>
-            <a:pPr lvl="1"/>
-            <a:br>
-              <a:rPr lang="en-IN" sz="1200" dirty="0">
-                <a:solidFill>
-                  <a:srgbClr val="EEFFFF"/>
-                </a:solidFill>
-                <a:latin typeface="Consolas" panose="020B0609020204030204" pitchFamily="49" charset="0"/>
-              </a:rPr>
-            </a:br>
-            <a:r>
-              <a:rPr lang="en-IN" sz="1200" i="1" dirty="0">
-                <a:solidFill>
-                  <a:srgbClr val="546E7A"/>
-                </a:solidFill>
-                <a:latin typeface="Consolas" panose="020B0609020204030204" pitchFamily="49" charset="0"/>
-              </a:rPr>
-              <a:t>//Solution res = </a:t>
-            </a:r>
-            <a:r>
-              <a:rPr lang="en-IN" sz="1200" i="1" dirty="0" err="1">
-                <a:solidFill>
-                  <a:srgbClr val="546E7A"/>
-                </a:solidFill>
-                <a:latin typeface="Consolas" panose="020B0609020204030204" pitchFamily="49" charset="0"/>
-              </a:rPr>
-              <a:t>compare_solutions</a:t>
-            </a:r>
-            <a:r>
-              <a:rPr lang="en-IN" sz="1200" i="1" dirty="0">
-                <a:solidFill>
-                  <a:srgbClr val="546E7A"/>
-                </a:solidFill>
-                <a:latin typeface="Consolas" panose="020B0609020204030204" pitchFamily="49" charset="0"/>
-              </a:rPr>
-              <a:t>(x, </a:t>
-            </a:r>
-            <a:r>
-              <a:rPr lang="en-IN" sz="1200" i="1" dirty="0" err="1">
-                <a:solidFill>
-                  <a:srgbClr val="546E7A"/>
-                </a:solidFill>
-                <a:latin typeface="Consolas" panose="020B0609020204030204" pitchFamily="49" charset="0"/>
-              </a:rPr>
-              <a:t>MPI.COMM_WORLD.Rank</a:t>
-            </a:r>
-            <a:r>
-              <a:rPr lang="en-IN" sz="1200" i="1" dirty="0">
-                <a:solidFill>
-                  <a:srgbClr val="546E7A"/>
-                </a:solidFill>
-                <a:latin typeface="Consolas" panose="020B0609020204030204" pitchFamily="49" charset="0"/>
-              </a:rPr>
-              <a:t>(), </a:t>
-            </a:r>
-            <a:r>
-              <a:rPr lang="en-IN" sz="1200" i="1" dirty="0" err="1">
-                <a:solidFill>
-                  <a:srgbClr val="546E7A"/>
-                </a:solidFill>
-                <a:latin typeface="Consolas" panose="020B0609020204030204" pitchFamily="49" charset="0"/>
-              </a:rPr>
-              <a:t>MPI.COMM_WORLD.Size</a:t>
-            </a:r>
-            <a:r>
-              <a:rPr lang="en-IN" sz="1200" i="1" dirty="0">
-                <a:solidFill>
-                  <a:srgbClr val="546E7A"/>
-                </a:solidFill>
-                <a:latin typeface="Consolas" panose="020B0609020204030204" pitchFamily="49" charset="0"/>
-              </a:rPr>
-              <a:t>());</a:t>
-            </a:r>
-            <a:endParaRPr lang="en-IN" sz="1200" dirty="0">
-              <a:solidFill>
-                <a:srgbClr val="EEFFFF"/>
-              </a:solidFill>
-              <a:latin typeface="Consolas" panose="020B0609020204030204" pitchFamily="49" charset="0"/>
-            </a:endParaRPr>
-          </a:p>
-          <a:p>
-            <a:pPr lvl="1"/>
-            <a:r>
-              <a:rPr lang="en-IN" sz="1200" dirty="0">
-                <a:solidFill>
-                  <a:srgbClr val="C792EA"/>
-                </a:solidFill>
-                <a:latin typeface="Consolas" panose="020B0609020204030204" pitchFamily="49" charset="0"/>
-              </a:rPr>
-              <a:t>Solution</a:t>
-            </a:r>
-            <a:r>
-              <a:rPr lang="en-IN" sz="1200" dirty="0">
-                <a:solidFill>
-                  <a:srgbClr val="EEFFFF"/>
-                </a:solidFill>
-                <a:latin typeface="Consolas" panose="020B0609020204030204" pitchFamily="49" charset="0"/>
-              </a:rPr>
-              <a:t> res </a:t>
-            </a:r>
-            <a:r>
-              <a:rPr lang="en-IN" sz="1200" dirty="0">
-                <a:solidFill>
-                  <a:srgbClr val="C792EA"/>
-                </a:solidFill>
-                <a:latin typeface="Consolas" panose="020B0609020204030204" pitchFamily="49" charset="0"/>
-              </a:rPr>
-              <a:t>=</a:t>
-            </a:r>
-            <a:r>
-              <a:rPr lang="en-IN" sz="1200" dirty="0">
-                <a:solidFill>
-                  <a:srgbClr val="EEFFFF"/>
-                </a:solidFill>
-                <a:latin typeface="Consolas" panose="020B0609020204030204" pitchFamily="49" charset="0"/>
-              </a:rPr>
-              <a:t> </a:t>
-            </a:r>
-            <a:r>
-              <a:rPr lang="en-IN" sz="1200" dirty="0">
-                <a:solidFill>
-                  <a:srgbClr val="89DDFF"/>
-                </a:solidFill>
-                <a:latin typeface="Consolas" panose="020B0609020204030204" pitchFamily="49" charset="0"/>
-              </a:rPr>
-              <a:t>(</a:t>
-            </a:r>
-            <a:r>
-              <a:rPr lang="en-IN" sz="1200" dirty="0">
-                <a:solidFill>
-                  <a:srgbClr val="EEFFFF"/>
-                </a:solidFill>
-                <a:latin typeface="Consolas" panose="020B0609020204030204" pitchFamily="49" charset="0"/>
-              </a:rPr>
-              <a:t>Solution</a:t>
-            </a:r>
-            <a:r>
-              <a:rPr lang="en-IN" sz="1200" dirty="0">
-                <a:solidFill>
-                  <a:srgbClr val="89DDFF"/>
-                </a:solidFill>
-                <a:latin typeface="Consolas" panose="020B0609020204030204" pitchFamily="49" charset="0"/>
-              </a:rPr>
-              <a:t>)</a:t>
-            </a:r>
-            <a:r>
-              <a:rPr lang="en-IN" sz="1200" dirty="0" err="1">
-                <a:solidFill>
-                  <a:srgbClr val="EEFFFF"/>
-                </a:solidFill>
-                <a:latin typeface="Consolas" panose="020B0609020204030204" pitchFamily="49" charset="0"/>
-              </a:rPr>
-              <a:t>Communicator</a:t>
-            </a:r>
-            <a:r>
-              <a:rPr lang="en-IN" sz="1200" dirty="0" err="1">
-                <a:solidFill>
-                  <a:srgbClr val="89DDFF"/>
-                </a:solidFill>
-                <a:latin typeface="Consolas" panose="020B0609020204030204" pitchFamily="49" charset="0"/>
-              </a:rPr>
-              <a:t>.</a:t>
-            </a:r>
-            <a:r>
-              <a:rPr lang="en-IN" sz="1200" dirty="0" err="1">
-                <a:solidFill>
-                  <a:srgbClr val="82AAFF"/>
-                </a:solidFill>
-                <a:latin typeface="Consolas" panose="020B0609020204030204" pitchFamily="49" charset="0"/>
-              </a:rPr>
-              <a:t>get_best_solution</a:t>
-            </a:r>
-            <a:r>
-              <a:rPr lang="en-IN" sz="1200" dirty="0">
-                <a:solidFill>
-                  <a:srgbClr val="89DDFF"/>
-                </a:solidFill>
-                <a:latin typeface="Consolas" panose="020B0609020204030204" pitchFamily="49" charset="0"/>
-              </a:rPr>
-              <a:t>(</a:t>
-            </a:r>
-            <a:r>
-              <a:rPr lang="en-IN" sz="1200" dirty="0">
-                <a:solidFill>
-                  <a:srgbClr val="EEFFFF"/>
-                </a:solidFill>
-                <a:latin typeface="Consolas" panose="020B0609020204030204" pitchFamily="49" charset="0"/>
-              </a:rPr>
-              <a:t>x</a:t>
-            </a:r>
-            <a:r>
-              <a:rPr lang="en-IN" sz="1200" dirty="0">
-                <a:solidFill>
-                  <a:srgbClr val="89DDFF"/>
-                </a:solidFill>
-                <a:latin typeface="Consolas" panose="020B0609020204030204" pitchFamily="49" charset="0"/>
-              </a:rPr>
-              <a:t>,</a:t>
-            </a:r>
-            <a:r>
-              <a:rPr lang="en-IN" sz="1200" dirty="0">
-                <a:solidFill>
-                  <a:srgbClr val="EEFFFF"/>
-                </a:solidFill>
-                <a:latin typeface="Consolas" panose="020B0609020204030204" pitchFamily="49" charset="0"/>
-              </a:rPr>
-              <a:t> </a:t>
-            </a:r>
-            <a:r>
-              <a:rPr lang="en-IN" sz="1200" dirty="0" err="1">
-                <a:solidFill>
-                  <a:srgbClr val="EEFFFF"/>
-                </a:solidFill>
-                <a:latin typeface="Consolas" panose="020B0609020204030204" pitchFamily="49" charset="0"/>
-              </a:rPr>
-              <a:t>MPI</a:t>
-            </a:r>
-            <a:r>
-              <a:rPr lang="en-IN" sz="1200" dirty="0" err="1">
-                <a:solidFill>
-                  <a:srgbClr val="89DDFF"/>
-                </a:solidFill>
-                <a:latin typeface="Consolas" panose="020B0609020204030204" pitchFamily="49" charset="0"/>
-              </a:rPr>
-              <a:t>.</a:t>
-            </a:r>
-            <a:r>
-              <a:rPr lang="en-IN" sz="1200" dirty="0" err="1">
-                <a:solidFill>
-                  <a:srgbClr val="EEFFFF"/>
-                </a:solidFill>
-                <a:latin typeface="Consolas" panose="020B0609020204030204" pitchFamily="49" charset="0"/>
-              </a:rPr>
-              <a:t>COMM_WORLD</a:t>
-            </a:r>
-            <a:r>
-              <a:rPr lang="en-IN" sz="1200" dirty="0" err="1">
-                <a:solidFill>
-                  <a:srgbClr val="89DDFF"/>
-                </a:solidFill>
-                <a:latin typeface="Consolas" panose="020B0609020204030204" pitchFamily="49" charset="0"/>
-              </a:rPr>
-              <a:t>.</a:t>
-            </a:r>
-            <a:r>
-              <a:rPr lang="en-IN" sz="1200" dirty="0" err="1">
-                <a:solidFill>
-                  <a:srgbClr val="82AAFF"/>
-                </a:solidFill>
-                <a:latin typeface="Consolas" panose="020B0609020204030204" pitchFamily="49" charset="0"/>
-              </a:rPr>
-              <a:t>Rank</a:t>
-            </a:r>
-            <a:r>
-              <a:rPr lang="en-IN" sz="1200" dirty="0">
-                <a:solidFill>
-                  <a:srgbClr val="89DDFF"/>
-                </a:solidFill>
-                <a:latin typeface="Consolas" panose="020B0609020204030204" pitchFamily="49" charset="0"/>
-              </a:rPr>
-              <a:t>(),</a:t>
-            </a:r>
-            <a:r>
-              <a:rPr lang="en-IN" sz="1200" dirty="0">
-                <a:solidFill>
-                  <a:srgbClr val="EEFFFF"/>
-                </a:solidFill>
-                <a:latin typeface="Consolas" panose="020B0609020204030204" pitchFamily="49" charset="0"/>
-              </a:rPr>
-              <a:t> </a:t>
-            </a:r>
-            <a:r>
-              <a:rPr lang="en-IN" sz="1200" dirty="0" err="1">
-                <a:solidFill>
-                  <a:srgbClr val="EEFFFF"/>
-                </a:solidFill>
-                <a:latin typeface="Consolas" panose="020B0609020204030204" pitchFamily="49" charset="0"/>
-              </a:rPr>
-              <a:t>MPI</a:t>
-            </a:r>
-            <a:r>
-              <a:rPr lang="en-IN" sz="1200" dirty="0" err="1">
-                <a:solidFill>
-                  <a:srgbClr val="89DDFF"/>
-                </a:solidFill>
-                <a:latin typeface="Consolas" panose="020B0609020204030204" pitchFamily="49" charset="0"/>
-              </a:rPr>
-              <a:t>.</a:t>
-            </a:r>
-            <a:r>
-              <a:rPr lang="en-IN" sz="1200" dirty="0" err="1">
-                <a:solidFill>
-                  <a:srgbClr val="EEFFFF"/>
-                </a:solidFill>
-                <a:latin typeface="Consolas" panose="020B0609020204030204" pitchFamily="49" charset="0"/>
-              </a:rPr>
-              <a:t>COMM_WORLD</a:t>
-            </a:r>
-            <a:r>
-              <a:rPr lang="en-IN" sz="1200" dirty="0" err="1">
-                <a:solidFill>
-                  <a:srgbClr val="89DDFF"/>
-                </a:solidFill>
-                <a:latin typeface="Consolas" panose="020B0609020204030204" pitchFamily="49" charset="0"/>
-              </a:rPr>
-              <a:t>.</a:t>
-            </a:r>
-            <a:r>
-              <a:rPr lang="en-IN" sz="1200" dirty="0" err="1">
-                <a:solidFill>
-                  <a:srgbClr val="82AAFF"/>
-                </a:solidFill>
-                <a:latin typeface="Consolas" panose="020B0609020204030204" pitchFamily="49" charset="0"/>
-              </a:rPr>
-              <a:t>Size</a:t>
-            </a:r>
-            <a:r>
-              <a:rPr lang="en-IN" sz="1200" dirty="0">
-                <a:solidFill>
-                  <a:srgbClr val="89DDFF"/>
-                </a:solidFill>
-                <a:latin typeface="Consolas" panose="020B0609020204030204" pitchFamily="49" charset="0"/>
-              </a:rPr>
-              <a:t>());</a:t>
-            </a:r>
-            <a:endParaRPr lang="en-IN" sz="1200" dirty="0">
-              <a:solidFill>
-                <a:srgbClr val="EEFFFF"/>
-              </a:solidFill>
-              <a:latin typeface="Consolas" panose="020B0609020204030204" pitchFamily="49" charset="0"/>
-            </a:endParaRPr>
-          </a:p>
-          <a:p>
-            <a:pPr lvl="1"/>
-            <a:br>
-              <a:rPr lang="en-IN" sz="1200" dirty="0">
-                <a:solidFill>
-                  <a:srgbClr val="EEFFFF"/>
-                </a:solidFill>
-                <a:latin typeface="Consolas" panose="020B0609020204030204" pitchFamily="49" charset="0"/>
-              </a:rPr>
-            </a:br>
-            <a:r>
-              <a:rPr lang="en-IN" sz="1200" i="1" dirty="0">
-                <a:solidFill>
-                  <a:srgbClr val="89DDFF"/>
-                </a:solidFill>
-                <a:latin typeface="Consolas" panose="020B0609020204030204" pitchFamily="49" charset="0"/>
-              </a:rPr>
-              <a:t>if</a:t>
-            </a:r>
-            <a:r>
-              <a:rPr lang="en-IN" sz="1200" dirty="0">
-                <a:solidFill>
-                  <a:srgbClr val="EEFFFF"/>
-                </a:solidFill>
-                <a:latin typeface="Consolas" panose="020B0609020204030204" pitchFamily="49" charset="0"/>
-              </a:rPr>
-              <a:t> </a:t>
-            </a:r>
-            <a:r>
-              <a:rPr lang="en-IN" sz="1200" dirty="0">
-                <a:solidFill>
-                  <a:srgbClr val="89DDFF"/>
-                </a:solidFill>
-                <a:latin typeface="Consolas" panose="020B0609020204030204" pitchFamily="49" charset="0"/>
-              </a:rPr>
-              <a:t>(</a:t>
-            </a:r>
-            <a:r>
-              <a:rPr lang="en-IN" sz="1200" dirty="0" err="1">
-                <a:solidFill>
-                  <a:srgbClr val="EEFFFF"/>
-                </a:solidFill>
-                <a:latin typeface="Consolas" panose="020B0609020204030204" pitchFamily="49" charset="0"/>
-              </a:rPr>
-              <a:t>MPI</a:t>
-            </a:r>
-            <a:r>
-              <a:rPr lang="en-IN" sz="1200" dirty="0" err="1">
-                <a:solidFill>
-                  <a:srgbClr val="89DDFF"/>
-                </a:solidFill>
-                <a:latin typeface="Consolas" panose="020B0609020204030204" pitchFamily="49" charset="0"/>
-              </a:rPr>
-              <a:t>.</a:t>
-            </a:r>
-            <a:r>
-              <a:rPr lang="en-IN" sz="1200" dirty="0" err="1">
-                <a:solidFill>
-                  <a:srgbClr val="EEFFFF"/>
-                </a:solidFill>
-                <a:latin typeface="Consolas" panose="020B0609020204030204" pitchFamily="49" charset="0"/>
-              </a:rPr>
-              <a:t>COMM_WORLD</a:t>
-            </a:r>
-            <a:r>
-              <a:rPr lang="en-IN" sz="1200" dirty="0" err="1">
-                <a:solidFill>
-                  <a:srgbClr val="89DDFF"/>
-                </a:solidFill>
-                <a:latin typeface="Consolas" panose="020B0609020204030204" pitchFamily="49" charset="0"/>
-              </a:rPr>
-              <a:t>.</a:t>
-            </a:r>
-            <a:r>
-              <a:rPr lang="en-IN" sz="1200" dirty="0" err="1">
-                <a:solidFill>
-                  <a:srgbClr val="82AAFF"/>
-                </a:solidFill>
-                <a:latin typeface="Consolas" panose="020B0609020204030204" pitchFamily="49" charset="0"/>
-              </a:rPr>
-              <a:t>Rank</a:t>
-            </a:r>
-            <a:r>
-              <a:rPr lang="en-IN" sz="1200" dirty="0">
-                <a:solidFill>
-                  <a:srgbClr val="89DDFF"/>
-                </a:solidFill>
-                <a:latin typeface="Consolas" panose="020B0609020204030204" pitchFamily="49" charset="0"/>
-              </a:rPr>
-              <a:t>()</a:t>
-            </a:r>
-            <a:r>
-              <a:rPr lang="en-IN" sz="1200" dirty="0">
-                <a:solidFill>
-                  <a:srgbClr val="EEFFFF"/>
-                </a:solidFill>
-                <a:latin typeface="Consolas" panose="020B0609020204030204" pitchFamily="49" charset="0"/>
-              </a:rPr>
-              <a:t> </a:t>
-            </a:r>
-            <a:r>
-              <a:rPr lang="en-IN" sz="1200" dirty="0">
-                <a:solidFill>
-                  <a:srgbClr val="C792EA"/>
-                </a:solidFill>
-                <a:latin typeface="Consolas" panose="020B0609020204030204" pitchFamily="49" charset="0"/>
-              </a:rPr>
-              <a:t>==</a:t>
-            </a:r>
-            <a:r>
-              <a:rPr lang="en-IN" sz="1200" dirty="0">
-                <a:solidFill>
-                  <a:srgbClr val="EEFFFF"/>
-                </a:solidFill>
-                <a:latin typeface="Consolas" panose="020B0609020204030204" pitchFamily="49" charset="0"/>
-              </a:rPr>
-              <a:t> </a:t>
-            </a:r>
-            <a:r>
-              <a:rPr lang="en-IN" sz="1200" dirty="0">
-                <a:solidFill>
-                  <a:srgbClr val="F78C6C"/>
-                </a:solidFill>
-                <a:latin typeface="Consolas" panose="020B0609020204030204" pitchFamily="49" charset="0"/>
-              </a:rPr>
-              <a:t>0</a:t>
-            </a:r>
-            <a:r>
-              <a:rPr lang="en-IN" sz="1200" dirty="0">
-                <a:solidFill>
-                  <a:srgbClr val="89DDFF"/>
-                </a:solidFill>
-                <a:latin typeface="Consolas" panose="020B0609020204030204" pitchFamily="49" charset="0"/>
-              </a:rPr>
-              <a:t>)</a:t>
-            </a:r>
-            <a:endParaRPr lang="en-IN" sz="1200" dirty="0">
-              <a:solidFill>
-                <a:srgbClr val="EEFFFF"/>
-              </a:solidFill>
-              <a:latin typeface="Consolas" panose="020B0609020204030204" pitchFamily="49" charset="0"/>
-            </a:endParaRPr>
-          </a:p>
-          <a:p>
-            <a:pPr lvl="1"/>
-            <a:r>
-              <a:rPr lang="en-IN" sz="1200" dirty="0">
-                <a:solidFill>
-                  <a:srgbClr val="89DDFF"/>
-                </a:solidFill>
-                <a:latin typeface="Consolas" panose="020B0609020204030204" pitchFamily="49" charset="0"/>
-              </a:rPr>
-              <a:t>{</a:t>
-            </a:r>
-            <a:endParaRPr lang="en-IN" sz="1200" dirty="0">
-              <a:solidFill>
-                <a:srgbClr val="EEFFFF"/>
-              </a:solidFill>
-              <a:latin typeface="Consolas" panose="020B0609020204030204" pitchFamily="49" charset="0"/>
-            </a:endParaRPr>
-          </a:p>
-          <a:p>
-            <a:pPr lvl="1"/>
-            <a:r>
-              <a:rPr lang="en-IN" sz="1200" dirty="0">
-                <a:solidFill>
-                  <a:srgbClr val="EEFFFF"/>
-                </a:solidFill>
-                <a:latin typeface="Consolas" panose="020B0609020204030204" pitchFamily="49" charset="0"/>
-              </a:rPr>
-              <a:t>	</a:t>
-            </a:r>
-            <a:r>
-              <a:rPr lang="en-IN" sz="1200" dirty="0" err="1">
-                <a:solidFill>
-                  <a:srgbClr val="EEFFFF"/>
-                </a:solidFill>
-                <a:latin typeface="Consolas" panose="020B0609020204030204" pitchFamily="49" charset="0"/>
-              </a:rPr>
-              <a:t>System</a:t>
-            </a:r>
-            <a:r>
-              <a:rPr lang="en-IN" sz="1200" dirty="0" err="1">
-                <a:solidFill>
-                  <a:srgbClr val="89DDFF"/>
-                </a:solidFill>
-                <a:latin typeface="Consolas" panose="020B0609020204030204" pitchFamily="49" charset="0"/>
-              </a:rPr>
-              <a:t>.</a:t>
-            </a:r>
-            <a:r>
-              <a:rPr lang="en-IN" sz="1200" dirty="0" err="1">
-                <a:solidFill>
-                  <a:srgbClr val="EEFFFF"/>
-                </a:solidFill>
-                <a:latin typeface="Consolas" panose="020B0609020204030204" pitchFamily="49" charset="0"/>
-              </a:rPr>
-              <a:t>out</a:t>
-            </a:r>
-            <a:r>
-              <a:rPr lang="en-IN" sz="1200" dirty="0" err="1">
-                <a:solidFill>
-                  <a:srgbClr val="89DDFF"/>
-                </a:solidFill>
-                <a:latin typeface="Consolas" panose="020B0609020204030204" pitchFamily="49" charset="0"/>
-              </a:rPr>
-              <a:t>.</a:t>
-            </a:r>
-            <a:r>
-              <a:rPr lang="en-IN" sz="1200" dirty="0" err="1">
-                <a:solidFill>
-                  <a:srgbClr val="82AAFF"/>
-                </a:solidFill>
-                <a:latin typeface="Consolas" panose="020B0609020204030204" pitchFamily="49" charset="0"/>
-              </a:rPr>
-              <a:t>println</a:t>
-            </a:r>
-            <a:r>
-              <a:rPr lang="en-IN" sz="1200" dirty="0">
-                <a:solidFill>
-                  <a:srgbClr val="89DDFF"/>
-                </a:solidFill>
-                <a:latin typeface="Consolas" panose="020B0609020204030204" pitchFamily="49" charset="0"/>
-              </a:rPr>
-              <a:t>("</a:t>
-            </a:r>
-            <a:r>
-              <a:rPr lang="en-IN" sz="1200" dirty="0">
-                <a:solidFill>
-                  <a:srgbClr val="C3E88D"/>
-                </a:solidFill>
-                <a:latin typeface="Consolas" panose="020B0609020204030204" pitchFamily="49" charset="0"/>
-              </a:rPr>
-              <a:t>Solution is:</a:t>
-            </a:r>
-            <a:r>
-              <a:rPr lang="en-IN" sz="1200" dirty="0">
-                <a:solidFill>
-                  <a:srgbClr val="89DDFF"/>
-                </a:solidFill>
-                <a:latin typeface="Consolas" panose="020B0609020204030204" pitchFamily="49" charset="0"/>
-              </a:rPr>
-              <a:t>"</a:t>
-            </a:r>
-            <a:r>
-              <a:rPr lang="en-IN" sz="1200" dirty="0">
-                <a:solidFill>
-                  <a:srgbClr val="EEFFFF"/>
-                </a:solidFill>
-                <a:latin typeface="Consolas" panose="020B0609020204030204" pitchFamily="49" charset="0"/>
-              </a:rPr>
-              <a:t> </a:t>
-            </a:r>
-            <a:r>
-              <a:rPr lang="en-IN" sz="1200" dirty="0">
-                <a:solidFill>
-                  <a:srgbClr val="C792EA"/>
-                </a:solidFill>
-                <a:latin typeface="Consolas" panose="020B0609020204030204" pitchFamily="49" charset="0"/>
-              </a:rPr>
-              <a:t>+</a:t>
-            </a:r>
-            <a:r>
-              <a:rPr lang="en-IN" sz="1200" dirty="0">
-                <a:solidFill>
-                  <a:srgbClr val="EEFFFF"/>
-                </a:solidFill>
-                <a:latin typeface="Consolas" panose="020B0609020204030204" pitchFamily="49" charset="0"/>
-              </a:rPr>
-              <a:t> res</a:t>
-            </a:r>
-            <a:r>
-              <a:rPr lang="en-IN" sz="1200" dirty="0">
-                <a:solidFill>
-                  <a:srgbClr val="89DDFF"/>
-                </a:solidFill>
-                <a:latin typeface="Consolas" panose="020B0609020204030204" pitchFamily="49" charset="0"/>
-              </a:rPr>
-              <a:t>);</a:t>
-            </a:r>
-            <a:endParaRPr lang="en-IN" sz="1200" dirty="0">
-              <a:solidFill>
-                <a:srgbClr val="EEFFFF"/>
-              </a:solidFill>
-              <a:latin typeface="Consolas" panose="020B0609020204030204" pitchFamily="49" charset="0"/>
-            </a:endParaRPr>
-          </a:p>
-          <a:p>
-            <a:pPr lvl="1"/>
-            <a:r>
-              <a:rPr lang="en-IN" sz="1200" dirty="0">
-                <a:solidFill>
-                  <a:srgbClr val="EEFFFF"/>
-                </a:solidFill>
-                <a:latin typeface="Consolas" panose="020B0609020204030204" pitchFamily="49" charset="0"/>
-              </a:rPr>
-              <a:t>	</a:t>
-            </a:r>
-            <a:r>
-              <a:rPr lang="en-IN" sz="1200" dirty="0" err="1">
-                <a:solidFill>
-                  <a:srgbClr val="EEFFFF"/>
-                </a:solidFill>
-                <a:latin typeface="Consolas" panose="020B0609020204030204" pitchFamily="49" charset="0"/>
-              </a:rPr>
-              <a:t>System</a:t>
-            </a:r>
-            <a:r>
-              <a:rPr lang="en-IN" sz="1200" dirty="0" err="1">
-                <a:solidFill>
-                  <a:srgbClr val="89DDFF"/>
-                </a:solidFill>
-                <a:latin typeface="Consolas" panose="020B0609020204030204" pitchFamily="49" charset="0"/>
-              </a:rPr>
-              <a:t>.</a:t>
-            </a:r>
-            <a:r>
-              <a:rPr lang="en-IN" sz="1200" dirty="0" err="1">
-                <a:solidFill>
-                  <a:srgbClr val="EEFFFF"/>
-                </a:solidFill>
-                <a:latin typeface="Consolas" panose="020B0609020204030204" pitchFamily="49" charset="0"/>
-              </a:rPr>
-              <a:t>out</a:t>
-            </a:r>
-            <a:r>
-              <a:rPr lang="en-IN" sz="1200" dirty="0" err="1">
-                <a:solidFill>
-                  <a:srgbClr val="89DDFF"/>
-                </a:solidFill>
-                <a:latin typeface="Consolas" panose="020B0609020204030204" pitchFamily="49" charset="0"/>
-              </a:rPr>
-              <a:t>.</a:t>
-            </a:r>
-            <a:r>
-              <a:rPr lang="en-IN" sz="1200" dirty="0" err="1">
-                <a:solidFill>
-                  <a:srgbClr val="82AAFF"/>
-                </a:solidFill>
-                <a:latin typeface="Consolas" panose="020B0609020204030204" pitchFamily="49" charset="0"/>
-              </a:rPr>
-              <a:t>println</a:t>
-            </a:r>
-            <a:r>
-              <a:rPr lang="en-IN" sz="1200" dirty="0">
-                <a:solidFill>
-                  <a:srgbClr val="89DDFF"/>
-                </a:solidFill>
-                <a:latin typeface="Consolas" panose="020B0609020204030204" pitchFamily="49" charset="0"/>
-              </a:rPr>
-              <a:t>("</a:t>
-            </a:r>
-            <a:r>
-              <a:rPr lang="en-IN" sz="1200" dirty="0">
-                <a:solidFill>
-                  <a:srgbClr val="C3E88D"/>
-                </a:solidFill>
-                <a:latin typeface="Consolas" panose="020B0609020204030204" pitchFamily="49" charset="0"/>
-              </a:rPr>
-              <a:t>Execution time: </a:t>
-            </a:r>
-            <a:r>
-              <a:rPr lang="en-IN" sz="1200" dirty="0">
-                <a:solidFill>
-                  <a:srgbClr val="89DDFF"/>
-                </a:solidFill>
-                <a:latin typeface="Consolas" panose="020B0609020204030204" pitchFamily="49" charset="0"/>
-              </a:rPr>
-              <a:t>"</a:t>
-            </a:r>
-            <a:r>
-              <a:rPr lang="en-IN" sz="1200" dirty="0">
-                <a:solidFill>
-                  <a:srgbClr val="EEFFFF"/>
-                </a:solidFill>
-                <a:latin typeface="Consolas" panose="020B0609020204030204" pitchFamily="49" charset="0"/>
-              </a:rPr>
-              <a:t> </a:t>
-            </a:r>
-            <a:r>
-              <a:rPr lang="en-IN" sz="1200" dirty="0">
-                <a:solidFill>
-                  <a:srgbClr val="C792EA"/>
-                </a:solidFill>
-                <a:latin typeface="Consolas" panose="020B0609020204030204" pitchFamily="49" charset="0"/>
-              </a:rPr>
-              <a:t>+</a:t>
-            </a:r>
-            <a:r>
-              <a:rPr lang="en-IN" sz="1200" dirty="0">
-                <a:solidFill>
-                  <a:srgbClr val="EEFFFF"/>
-                </a:solidFill>
-                <a:latin typeface="Consolas" panose="020B0609020204030204" pitchFamily="49" charset="0"/>
-              </a:rPr>
-              <a:t> time </a:t>
-            </a:r>
-            <a:r>
-              <a:rPr lang="en-IN" sz="1200" dirty="0">
-                <a:solidFill>
-                  <a:srgbClr val="C792EA"/>
-                </a:solidFill>
-                <a:latin typeface="Consolas" panose="020B0609020204030204" pitchFamily="49" charset="0"/>
-              </a:rPr>
-              <a:t>+</a:t>
-            </a:r>
-            <a:r>
-              <a:rPr lang="en-IN" sz="1200" dirty="0">
-                <a:solidFill>
-                  <a:srgbClr val="EEFFFF"/>
-                </a:solidFill>
-                <a:latin typeface="Consolas" panose="020B0609020204030204" pitchFamily="49" charset="0"/>
-              </a:rPr>
-              <a:t> </a:t>
-            </a:r>
-            <a:r>
-              <a:rPr lang="en-IN" sz="1200" dirty="0">
-                <a:solidFill>
-                  <a:srgbClr val="89DDFF"/>
-                </a:solidFill>
-                <a:latin typeface="Consolas" panose="020B0609020204030204" pitchFamily="49" charset="0"/>
-              </a:rPr>
-              <a:t>"</a:t>
-            </a:r>
-            <a:r>
-              <a:rPr lang="en-IN" sz="1200" dirty="0">
-                <a:solidFill>
-                  <a:srgbClr val="C3E88D"/>
-                </a:solidFill>
-                <a:latin typeface="Consolas" panose="020B0609020204030204" pitchFamily="49" charset="0"/>
-              </a:rPr>
-              <a:t> </a:t>
-            </a:r>
-            <a:r>
-              <a:rPr lang="en-IN" sz="1200" dirty="0" err="1">
-                <a:solidFill>
-                  <a:srgbClr val="C3E88D"/>
-                </a:solidFill>
-                <a:latin typeface="Consolas" panose="020B0609020204030204" pitchFamily="49" charset="0"/>
-              </a:rPr>
-              <a:t>ms</a:t>
-            </a:r>
-            <a:r>
-              <a:rPr lang="en-IN" sz="1200" dirty="0">
-                <a:solidFill>
-                  <a:srgbClr val="C3E88D"/>
-                </a:solidFill>
-                <a:latin typeface="Consolas" panose="020B0609020204030204" pitchFamily="49" charset="0"/>
-              </a:rPr>
-              <a:t>.</a:t>
-            </a:r>
-            <a:r>
-              <a:rPr lang="en-IN" sz="1200" dirty="0">
-                <a:solidFill>
-                  <a:srgbClr val="89DDFF"/>
-                </a:solidFill>
-                <a:latin typeface="Consolas" panose="020B0609020204030204" pitchFamily="49" charset="0"/>
-              </a:rPr>
-              <a:t>");</a:t>
-            </a:r>
-            <a:endParaRPr lang="en-IN" sz="1200" dirty="0">
-              <a:solidFill>
-                <a:srgbClr val="EEFFFF"/>
-              </a:solidFill>
-              <a:latin typeface="Consolas" panose="020B0609020204030204" pitchFamily="49" charset="0"/>
-            </a:endParaRPr>
-          </a:p>
-          <a:p>
-            <a:pPr lvl="1"/>
-            <a:r>
-              <a:rPr lang="en-IN" sz="1200" dirty="0">
-                <a:solidFill>
-                  <a:srgbClr val="89DDFF"/>
-                </a:solidFill>
-                <a:latin typeface="Consolas" panose="020B0609020204030204" pitchFamily="49" charset="0"/>
-              </a:rPr>
-              <a:t>}</a:t>
-            </a:r>
-            <a:r>
-              <a:rPr lang="en-IN" sz="1200" dirty="0">
-                <a:solidFill>
-                  <a:srgbClr val="EEFFFF"/>
-                </a:solidFill>
-                <a:latin typeface="Consolas" panose="020B0609020204030204" pitchFamily="49" charset="0"/>
-              </a:rPr>
-              <a:t> </a:t>
-            </a:r>
-            <a:r>
-              <a:rPr lang="en-IN" sz="1200" i="1" dirty="0">
-                <a:solidFill>
-                  <a:srgbClr val="546E7A"/>
-                </a:solidFill>
-                <a:latin typeface="Consolas" panose="020B0609020204030204" pitchFamily="49" charset="0"/>
-              </a:rPr>
-              <a:t>// end if</a:t>
-            </a:r>
-            <a:endParaRPr lang="en-IN" sz="1200" dirty="0">
-              <a:solidFill>
-                <a:srgbClr val="EEFFFF"/>
-              </a:solidFill>
-              <a:latin typeface="Consolas" panose="020B0609020204030204" pitchFamily="49" charset="0"/>
-            </a:endParaRPr>
-          </a:p>
-          <a:p>
-            <a:r>
-              <a:rPr lang="en-IN" sz="1200" dirty="0">
-                <a:solidFill>
-                  <a:srgbClr val="89DDFF"/>
-                </a:solidFill>
-                <a:latin typeface="Consolas" panose="020B0609020204030204" pitchFamily="49" charset="0"/>
-              </a:rPr>
-              <a:t>}</a:t>
-            </a:r>
-            <a:endParaRPr lang="en-IN" sz="1200" b="0" dirty="0">
-              <a:solidFill>
-                <a:srgbClr val="EEFFFF"/>
-              </a:solidFill>
-              <a:effectLst/>
-              <a:latin typeface="Consolas" panose="020B0609020204030204" pitchFamily="49" charset="0"/>
-            </a:endParaRPr>
-          </a:p>
-        </p:txBody>
-      </p:sp>
+      </p:pic>
     </p:spTree>
     <p:extLst>
       <p:ext uri="{BB962C8B-B14F-4D97-AF65-F5344CB8AC3E}">
@@ -16059,341 +14427,35 @@
           </a:p>
         </p:txBody>
       </p:sp>
-      <p:sp>
-        <p:nvSpPr>
-          <p:cNvPr id="4" name="Content Placeholder 5">
+      <p:pic>
+        <p:nvPicPr>
+          <p:cNvPr id="5" name="Picture 4">
             <a:extLst>
               <a:ext uri="{FF2B5EF4-FFF2-40B4-BE49-F238E27FC236}">
-                <a16:creationId xmlns:a16="http://schemas.microsoft.com/office/drawing/2014/main" id="{A16B3085-70C6-4B05-875E-329D6EED6FA0}"/>
+                <a16:creationId xmlns:a16="http://schemas.microsoft.com/office/drawing/2014/main" id="{8E1E6F8A-A3DE-4D1A-80C9-97AA02747EB9}"/>
               </a:ext>
             </a:extLst>
           </p:cNvPr>
-          <p:cNvSpPr txBox="1">
-            <a:spLocks/>
-          </p:cNvSpPr>
+          <p:cNvPicPr>
+            <a:picLocks noChangeAspect="1"/>
+          </p:cNvPicPr>
           <p:nvPr/>
-        </p:nvSpPr>
+        </p:nvPicPr>
+        <p:blipFill rotWithShape="1">
+          <a:blip r:embed="rId2"/>
+          <a:srcRect t="43072" r="48788"/>
+          <a:stretch/>
+        </p:blipFill>
         <p:spPr>
           <a:xfrm>
-            <a:off x="1126835" y="1226959"/>
-            <a:ext cx="10178322" cy="4200882"/>
+            <a:off x="1126835" y="1295399"/>
+            <a:ext cx="10331740" cy="4923208"/>
           </a:xfrm>
           <a:prstGeom prst="rect">
             <a:avLst/>
           </a:prstGeom>
         </p:spPr>
-        <p:txBody>
-          <a:bodyPr vert="horz" lIns="91440" tIns="45720" rIns="91440" bIns="45720" rtlCol="0">
-            <a:noAutofit/>
-          </a:bodyPr>
-          <a:lstStyle>
-            <a:lvl1pPr marL="228600" indent="-228600" algn="l" defTabSz="914400" rtl="0" eaLnBrk="1" latinLnBrk="0" hangingPunct="1">
-              <a:lnSpc>
-                <a:spcPct val="110000"/>
-              </a:lnSpc>
-              <a:spcBef>
-                <a:spcPts val="700"/>
-              </a:spcBef>
-              <a:buClr>
-                <a:schemeClr val="tx2"/>
-              </a:buClr>
-              <a:buFont typeface="Arial" panose="020B0604020202020204" pitchFamily="34" charset="0"/>
-              <a:buChar char="•"/>
-              <a:defRPr sz="2000" kern="1200">
-                <a:solidFill>
-                  <a:schemeClr val="tx1">
-                    <a:lumMod val="65000"/>
-                    <a:lumOff val="35000"/>
-                  </a:schemeClr>
-                </a:solidFill>
-                <a:latin typeface="+mn-lt"/>
-                <a:ea typeface="+mn-ea"/>
-                <a:cs typeface="+mn-cs"/>
-              </a:defRPr>
-            </a:lvl1pPr>
-            <a:lvl2pPr marL="685800" indent="-228600" algn="l" defTabSz="914400" rtl="0" eaLnBrk="1" latinLnBrk="0" hangingPunct="1">
-              <a:lnSpc>
-                <a:spcPct val="110000"/>
-              </a:lnSpc>
-              <a:spcBef>
-                <a:spcPts val="700"/>
-              </a:spcBef>
-              <a:buClr>
-                <a:schemeClr val="tx2"/>
-              </a:buClr>
-              <a:buFont typeface="Gill Sans MT" panose="020B0502020104020203" pitchFamily="34" charset="0"/>
-              <a:buChar char="–"/>
-              <a:defRPr sz="1800" kern="1200">
-                <a:solidFill>
-                  <a:schemeClr val="tx1">
-                    <a:lumMod val="65000"/>
-                    <a:lumOff val="35000"/>
-                  </a:schemeClr>
-                </a:solidFill>
-                <a:latin typeface="+mn-lt"/>
-                <a:ea typeface="+mn-ea"/>
-                <a:cs typeface="+mn-cs"/>
-              </a:defRPr>
-            </a:lvl2pPr>
-            <a:lvl3pPr marL="1143000" indent="-228600" algn="l" defTabSz="914400" rtl="0" eaLnBrk="1" latinLnBrk="0" hangingPunct="1">
-              <a:lnSpc>
-                <a:spcPct val="110000"/>
-              </a:lnSpc>
-              <a:spcBef>
-                <a:spcPts val="700"/>
-              </a:spcBef>
-              <a:buClr>
-                <a:schemeClr val="tx2"/>
-              </a:buClr>
-              <a:buFont typeface="Arial" panose="020B0604020202020204" pitchFamily="34" charset="0"/>
-              <a:buChar char="•"/>
-              <a:defRPr sz="1600" kern="1200">
-                <a:solidFill>
-                  <a:schemeClr val="tx1">
-                    <a:lumMod val="65000"/>
-                    <a:lumOff val="35000"/>
-                  </a:schemeClr>
-                </a:solidFill>
-                <a:latin typeface="+mn-lt"/>
-                <a:ea typeface="+mn-ea"/>
-                <a:cs typeface="+mn-cs"/>
-              </a:defRPr>
-            </a:lvl3pPr>
-            <a:lvl4pPr marL="1600200" indent="-228600" algn="l" defTabSz="914400" rtl="0" eaLnBrk="1" latinLnBrk="0" hangingPunct="1">
-              <a:lnSpc>
-                <a:spcPct val="110000"/>
-              </a:lnSpc>
-              <a:spcBef>
-                <a:spcPts val="700"/>
-              </a:spcBef>
-              <a:buClr>
-                <a:schemeClr val="tx2"/>
-              </a:buClr>
-              <a:buFont typeface="Gill Sans MT" panose="020B0502020104020203" pitchFamily="34" charset="0"/>
-              <a:buChar char="–"/>
-              <a:defRPr sz="1400" kern="1200">
-                <a:solidFill>
-                  <a:schemeClr val="tx1">
-                    <a:lumMod val="65000"/>
-                    <a:lumOff val="35000"/>
-                  </a:schemeClr>
-                </a:solidFill>
-                <a:latin typeface="+mn-lt"/>
-                <a:ea typeface="+mn-ea"/>
-                <a:cs typeface="+mn-cs"/>
-              </a:defRPr>
-            </a:lvl4pPr>
-            <a:lvl5pPr marL="2057400" indent="-228600" algn="l" defTabSz="914400" rtl="0" eaLnBrk="1" latinLnBrk="0" hangingPunct="1">
-              <a:lnSpc>
-                <a:spcPct val="110000"/>
-              </a:lnSpc>
-              <a:spcBef>
-                <a:spcPts val="700"/>
-              </a:spcBef>
-              <a:buClr>
-                <a:schemeClr val="tx2"/>
-              </a:buClr>
-              <a:buFont typeface="Arial" panose="020B0604020202020204" pitchFamily="34" charset="0"/>
-              <a:buChar char="•"/>
-              <a:defRPr sz="1400" kern="1200">
-                <a:solidFill>
-                  <a:schemeClr val="tx1">
-                    <a:lumMod val="65000"/>
-                    <a:lumOff val="35000"/>
-                  </a:schemeClr>
-                </a:solidFill>
-                <a:latin typeface="+mn-lt"/>
-                <a:ea typeface="+mn-ea"/>
-                <a:cs typeface="+mn-cs"/>
-              </a:defRPr>
-            </a:lvl5pPr>
-            <a:lvl6pPr marL="2514600" indent="-228600" algn="l" defTabSz="914400" rtl="0" eaLnBrk="1" latinLnBrk="0" hangingPunct="1">
-              <a:lnSpc>
-                <a:spcPct val="110000"/>
-              </a:lnSpc>
-              <a:spcBef>
-                <a:spcPts val="700"/>
-              </a:spcBef>
-              <a:buClr>
-                <a:schemeClr val="tx2"/>
-              </a:buClr>
-              <a:buFont typeface="Gill Sans MT" panose="020B0502020104020203" pitchFamily="34" charset="0"/>
-              <a:buChar char="–"/>
-              <a:defRPr sz="1400" kern="1200">
-                <a:solidFill>
-                  <a:schemeClr val="tx1">
-                    <a:lumMod val="65000"/>
-                    <a:lumOff val="35000"/>
-                  </a:schemeClr>
-                </a:solidFill>
-                <a:latin typeface="+mn-lt"/>
-                <a:ea typeface="+mn-ea"/>
-                <a:cs typeface="+mn-cs"/>
-              </a:defRPr>
-            </a:lvl6pPr>
-            <a:lvl7pPr marL="2971800" indent="-228600" algn="l" defTabSz="914400" rtl="0" eaLnBrk="1" latinLnBrk="0" hangingPunct="1">
-              <a:lnSpc>
-                <a:spcPct val="110000"/>
-              </a:lnSpc>
-              <a:spcBef>
-                <a:spcPts val="700"/>
-              </a:spcBef>
-              <a:buClr>
-                <a:schemeClr val="tx2"/>
-              </a:buClr>
-              <a:buFont typeface="Arial" panose="020B0604020202020204" pitchFamily="34" charset="0"/>
-              <a:buChar char="•"/>
-              <a:defRPr sz="1400" kern="1200">
-                <a:solidFill>
-                  <a:schemeClr val="tx1">
-                    <a:lumMod val="65000"/>
-                    <a:lumOff val="35000"/>
-                  </a:schemeClr>
-                </a:solidFill>
-                <a:latin typeface="+mn-lt"/>
-                <a:ea typeface="+mn-ea"/>
-                <a:cs typeface="+mn-cs"/>
-              </a:defRPr>
-            </a:lvl7pPr>
-            <a:lvl8pPr marL="3429000" indent="-228600" algn="l" defTabSz="914400" rtl="0" eaLnBrk="1" latinLnBrk="0" hangingPunct="1">
-              <a:lnSpc>
-                <a:spcPct val="110000"/>
-              </a:lnSpc>
-              <a:spcBef>
-                <a:spcPts val="700"/>
-              </a:spcBef>
-              <a:buClr>
-                <a:schemeClr val="tx2"/>
-              </a:buClr>
-              <a:buFont typeface="Gill Sans MT" panose="020B0502020104020203" pitchFamily="34" charset="0"/>
-              <a:buChar char="–"/>
-              <a:defRPr sz="1400" kern="1200" baseline="0">
-                <a:solidFill>
-                  <a:schemeClr val="tx1">
-                    <a:lumMod val="65000"/>
-                    <a:lumOff val="35000"/>
-                  </a:schemeClr>
-                </a:solidFill>
-                <a:latin typeface="+mn-lt"/>
-                <a:ea typeface="+mn-ea"/>
-                <a:cs typeface="+mn-cs"/>
-              </a:defRPr>
-            </a:lvl8pPr>
-            <a:lvl9pPr marL="3886200" indent="-228600" algn="l" defTabSz="914400" rtl="0" eaLnBrk="1" latinLnBrk="0" hangingPunct="1">
-              <a:lnSpc>
-                <a:spcPct val="110000"/>
-              </a:lnSpc>
-              <a:spcBef>
-                <a:spcPts val="700"/>
-              </a:spcBef>
-              <a:buClr>
-                <a:schemeClr val="tx2"/>
-              </a:buClr>
-              <a:buFont typeface="Arial" panose="020B0604020202020204" pitchFamily="34" charset="0"/>
-              <a:buChar char="•"/>
-              <a:defRPr sz="1400" kern="1200" baseline="0">
-                <a:solidFill>
-                  <a:schemeClr val="tx1">
-                    <a:lumMod val="65000"/>
-                    <a:lumOff val="35000"/>
-                  </a:schemeClr>
-                </a:solidFill>
-                <a:latin typeface="+mn-lt"/>
-                <a:ea typeface="+mn-ea"/>
-                <a:cs typeface="+mn-cs"/>
-              </a:defRPr>
-            </a:lvl9pPr>
-          </a:lstStyle>
-          <a:p>
-            <a:pPr marL="0" indent="0">
-              <a:buNone/>
-            </a:pPr>
-            <a:r>
-              <a:rPr lang="en-US" dirty="0"/>
-              <a:t>Broadcasting:</a:t>
-            </a:r>
-          </a:p>
-          <a:p>
-            <a:pPr marL="0" indent="0">
-              <a:buNone/>
-            </a:pPr>
-            <a:r>
-              <a:rPr lang="en-US" dirty="0"/>
-              <a:t>	Array of Random-Generators each with different seed</a:t>
-            </a:r>
-          </a:p>
-          <a:p>
-            <a:pPr marL="0" indent="0">
-              <a:buNone/>
-            </a:pPr>
-            <a:r>
-              <a:rPr lang="en-US" dirty="0"/>
-              <a:t>	Best solution</a:t>
-            </a:r>
-          </a:p>
-          <a:p>
-            <a:pPr marL="0" indent="0">
-              <a:buNone/>
-            </a:pPr>
-            <a:r>
-              <a:rPr lang="en-US" dirty="0"/>
-              <a:t>RDD: </a:t>
-            </a:r>
-          </a:p>
-          <a:p>
-            <a:pPr marL="0" indent="0">
-              <a:buNone/>
-            </a:pPr>
-            <a:r>
-              <a:rPr lang="en-US" dirty="0"/>
-              <a:t>	Contain initial solutions as many as the number of partitions</a:t>
-            </a:r>
-          </a:p>
-          <a:p>
-            <a:pPr marL="0" indent="0">
-              <a:buNone/>
-            </a:pPr>
-            <a:r>
-              <a:rPr lang="en-US" dirty="0"/>
-              <a:t>Technique:</a:t>
-            </a:r>
-          </a:p>
-          <a:p>
-            <a:pPr marL="0" indent="0">
-              <a:buNone/>
-            </a:pPr>
-            <a:r>
-              <a:rPr lang="en-US" dirty="0"/>
-              <a:t>	Map transformation to execute the inner loop</a:t>
-            </a:r>
-          </a:p>
-          <a:p>
-            <a:pPr marL="0" indent="0">
-              <a:buNone/>
-            </a:pPr>
-            <a:r>
-              <a:rPr lang="en-US" dirty="0"/>
-              <a:t>	Reduce for best solution</a:t>
-            </a:r>
-          </a:p>
-          <a:p>
-            <a:pPr marL="0" indent="0">
-              <a:buNone/>
-            </a:pPr>
-            <a:r>
-              <a:rPr lang="en-US" dirty="0"/>
-              <a:t>	Broadcast the best solution and repeat until outer loop’s condition is satisfied</a:t>
-            </a:r>
-          </a:p>
-          <a:p>
-            <a:pPr marL="0" indent="0" algn="ctr">
-              <a:buFont typeface="Arial" panose="020B0604020202020204" pitchFamily="34" charset="0"/>
-              <a:buNone/>
-            </a:pPr>
-            <a:endParaRPr lang="en-IN" sz="2400" dirty="0"/>
-          </a:p>
-        </p:txBody>
-      </p:sp>
+      </p:pic>
     </p:spTree>
     <p:extLst>
       <p:ext uri="{BB962C8B-B14F-4D97-AF65-F5344CB8AC3E}">

</xml_diff>